<commit_message>
complite learn git remote season1 at PZN
</commit_message>
<xml_diff>
--- a/1.1 Learn Git/Recap Git.pptx
+++ b/1.1 Learn Git/Recap Git.pptx
@@ -5,11 +5,19 @@
     <p:sldMasterId id="2147483648" r:id="rId2"/>
     <p:sldMasterId id="2147483661" r:id="rId3"/>
     <p:sldMasterId id="2147483674" r:id="rId4"/>
+    <p:sldMasterId id="2147483687" r:id="rId5"/>
   </p:sldMasterIdLst>
   <p:sldIdLst>
-    <p:sldId id="256" r:id="rId5"/>
-    <p:sldId id="257" r:id="rId6"/>
-    <p:sldId id="258" r:id="rId7"/>
+    <p:sldId id="256" r:id="rId6"/>
+    <p:sldId id="257" r:id="rId7"/>
+    <p:sldId id="258" r:id="rId8"/>
+    <p:sldId id="259" r:id="rId9"/>
+    <p:sldId id="260" r:id="rId10"/>
+    <p:sldId id="261" r:id="rId11"/>
+    <p:sldId id="262" r:id="rId12"/>
+    <p:sldId id="263" r:id="rId13"/>
+    <p:sldId id="264" r:id="rId14"/>
+    <p:sldId id="265" r:id="rId15"/>
   </p:sldIdLst>
   <p:sldSz cx="9144000" cy="5143500"/>
   <p:notesSz cx="6858000" cy="9144000"/>
@@ -3669,6 +3677,202 @@
 </p:sldLayout>
 </file>
 
+<file path=ppt/slideLayouts/slideLayout37.xml><?xml version="1.0" encoding="utf-8"?>
+<p:sldLayout xmlns:a="http://schemas.openxmlformats.org/drawingml/2006/main" xmlns:p="http://schemas.openxmlformats.org/presentationml/2006/main" xmlns:r="http://schemas.openxmlformats.org/officeDocument/2006/relationships" xmlns:p14="http://schemas.microsoft.com/office/powerpoint/2010/main" xmlns:p15="http://schemas.microsoft.com/office/powerpoint/2012/main" xmlns:mc="http://schemas.openxmlformats.org/markup-compatibility/2006" type="blank" preserve="1">
+  <p:cSld name="Blank Slide">
+    <p:spTree>
+      <p:nvGrpSpPr>
+        <p:cNvPr id="1" name=""/>
+        <p:cNvGrpSpPr/>
+        <p:nvPr/>
+      </p:nvGrpSpPr>
+      <p:grpSpPr>
+        <a:xfrm>
+          <a:off x="0" y="0"/>
+          <a:ext cx="0" cy="0"/>
+          <a:chOff x="0" y="0"/>
+          <a:chExt cx="0" cy="0"/>
+        </a:xfrm>
+      </p:grpSpPr>
+    </p:spTree>
+  </p:cSld>
+</p:sldLayout>
+</file>
+
+<file path=ppt/slideLayouts/slideLayout38.xml><?xml version="1.0" encoding="utf-8"?>
+<p:sldLayout xmlns:a="http://schemas.openxmlformats.org/drawingml/2006/main" xmlns:p="http://schemas.openxmlformats.org/presentationml/2006/main" xmlns:r="http://schemas.openxmlformats.org/officeDocument/2006/relationships" xmlns:p14="http://schemas.microsoft.com/office/powerpoint/2010/main" xmlns:p15="http://schemas.microsoft.com/office/powerpoint/2012/main" xmlns:mc="http://schemas.openxmlformats.org/markup-compatibility/2006" type="tx" preserve="1">
+  <p:cSld name="Title Slide">
+    <p:spTree>
+      <p:nvGrpSpPr>
+        <p:cNvPr id="1" name=""/>
+        <p:cNvGrpSpPr/>
+        <p:nvPr/>
+      </p:nvGrpSpPr>
+      <p:grpSpPr>
+        <a:xfrm>
+          <a:off x="0" y="0"/>
+          <a:ext cx="0" cy="0"/>
+          <a:chOff x="0" y="0"/>
+          <a:chExt cx="0" cy="0"/>
+        </a:xfrm>
+      </p:grpSpPr>
+      <p:sp>
+        <p:nvSpPr>
+          <p:cNvPr id="135" name="PlaceHolder 1"/>
+          <p:cNvSpPr>
+            <a:spLocks noGrp="1"/>
+          </p:cNvSpPr>
+          <p:nvPr>
+            <p:ph type="title"/>
+          </p:nvPr>
+        </p:nvSpPr>
+        <p:spPr>
+          <a:xfrm>
+            <a:off x="729360" y="1318680"/>
+            <a:ext cx="7688520" cy="534960"/>
+          </a:xfrm>
+          <a:prstGeom prst="rect">
+            <a:avLst/>
+          </a:prstGeom>
+        </p:spPr>
+        <p:txBody>
+          <a:bodyPr lIns="0" rIns="0" tIns="0" bIns="0" anchor="ctr">
+            <a:noAutofit/>
+          </a:bodyPr>
+          <a:p>
+            <a:endParaRPr b="0" lang="en-US" sz="1400" spc="-1" strike="noStrike">
+              <a:solidFill>
+                <a:srgbClr val="000000"/>
+              </a:solidFill>
+              <a:latin typeface="Arial"/>
+            </a:endParaRPr>
+          </a:p>
+        </p:txBody>
+      </p:sp>
+      <p:sp>
+        <p:nvSpPr>
+          <p:cNvPr id="136" name="PlaceHolder 2"/>
+          <p:cNvSpPr>
+            <a:spLocks noGrp="1"/>
+          </p:cNvSpPr>
+          <p:nvPr>
+            <p:ph type="subTitle"/>
+          </p:nvPr>
+        </p:nvSpPr>
+        <p:spPr>
+          <a:xfrm>
+            <a:off x="729360" y="2079000"/>
+            <a:ext cx="7688520" cy="2260800"/>
+          </a:xfrm>
+          <a:prstGeom prst="rect">
+            <a:avLst/>
+          </a:prstGeom>
+        </p:spPr>
+        <p:txBody>
+          <a:bodyPr lIns="0" rIns="0" tIns="0" bIns="0" anchor="ctr">
+            <a:noAutofit/>
+          </a:bodyPr>
+          <a:p>
+            <a:pPr algn="ctr"/>
+            <a:endParaRPr b="0" lang="en-US" sz="3200" spc="-1" strike="noStrike">
+              <a:latin typeface="Arial"/>
+            </a:endParaRPr>
+          </a:p>
+        </p:txBody>
+      </p:sp>
+    </p:spTree>
+  </p:cSld>
+</p:sldLayout>
+</file>
+
+<file path=ppt/slideLayouts/slideLayout39.xml><?xml version="1.0" encoding="utf-8"?>
+<p:sldLayout xmlns:a="http://schemas.openxmlformats.org/drawingml/2006/main" xmlns:p="http://schemas.openxmlformats.org/presentationml/2006/main" xmlns:r="http://schemas.openxmlformats.org/officeDocument/2006/relationships" xmlns:p14="http://schemas.microsoft.com/office/powerpoint/2010/main" xmlns:p15="http://schemas.microsoft.com/office/powerpoint/2012/main" xmlns:mc="http://schemas.openxmlformats.org/markup-compatibility/2006" type="obj" preserve="1">
+  <p:cSld name="Title, Content">
+    <p:spTree>
+      <p:nvGrpSpPr>
+        <p:cNvPr id="1" name=""/>
+        <p:cNvGrpSpPr/>
+        <p:nvPr/>
+      </p:nvGrpSpPr>
+      <p:grpSpPr>
+        <a:xfrm>
+          <a:off x="0" y="0"/>
+          <a:ext cx="0" cy="0"/>
+          <a:chOff x="0" y="0"/>
+          <a:chExt cx="0" cy="0"/>
+        </a:xfrm>
+      </p:grpSpPr>
+      <p:sp>
+        <p:nvSpPr>
+          <p:cNvPr id="137" name="PlaceHolder 1"/>
+          <p:cNvSpPr>
+            <a:spLocks noGrp="1"/>
+          </p:cNvSpPr>
+          <p:nvPr>
+            <p:ph type="title"/>
+          </p:nvPr>
+        </p:nvSpPr>
+        <p:spPr>
+          <a:xfrm>
+            <a:off x="729360" y="1318680"/>
+            <a:ext cx="7688520" cy="534960"/>
+          </a:xfrm>
+          <a:prstGeom prst="rect">
+            <a:avLst/>
+          </a:prstGeom>
+        </p:spPr>
+        <p:txBody>
+          <a:bodyPr lIns="0" rIns="0" tIns="0" bIns="0" anchor="ctr">
+            <a:noAutofit/>
+          </a:bodyPr>
+          <a:p>
+            <a:endParaRPr b="0" lang="en-US" sz="1400" spc="-1" strike="noStrike">
+              <a:solidFill>
+                <a:srgbClr val="000000"/>
+              </a:solidFill>
+              <a:latin typeface="Arial"/>
+            </a:endParaRPr>
+          </a:p>
+        </p:txBody>
+      </p:sp>
+      <p:sp>
+        <p:nvSpPr>
+          <p:cNvPr id="138" name="PlaceHolder 2"/>
+          <p:cNvSpPr>
+            <a:spLocks noGrp="1"/>
+          </p:cNvSpPr>
+          <p:nvPr>
+            <p:ph type="body"/>
+          </p:nvPr>
+        </p:nvSpPr>
+        <p:spPr>
+          <a:xfrm>
+            <a:off x="729360" y="2079000"/>
+            <a:ext cx="7688520" cy="2260800"/>
+          </a:xfrm>
+          <a:prstGeom prst="rect">
+            <a:avLst/>
+          </a:prstGeom>
+        </p:spPr>
+        <p:txBody>
+          <a:bodyPr lIns="0" rIns="0" tIns="0" bIns="0">
+            <a:normAutofit/>
+          </a:bodyPr>
+          <a:p>
+            <a:endParaRPr b="0" lang="en-US" sz="1400" spc="-1" strike="noStrike">
+              <a:solidFill>
+                <a:srgbClr val="000000"/>
+              </a:solidFill>
+              <a:latin typeface="Arial"/>
+            </a:endParaRPr>
+          </a:p>
+        </p:txBody>
+      </p:sp>
+    </p:spTree>
+  </p:cSld>
+</p:sldLayout>
+</file>
+
 <file path=ppt/slideLayouts/slideLayout4.xml><?xml version="1.0" encoding="utf-8"?>
 <p:sldLayout xmlns:a="http://schemas.openxmlformats.org/drawingml/2006/main" xmlns:p="http://schemas.openxmlformats.org/presentationml/2006/main" xmlns:r="http://schemas.openxmlformats.org/officeDocument/2006/relationships" xmlns:p14="http://schemas.microsoft.com/office/powerpoint/2010/main" xmlns:p15="http://schemas.microsoft.com/office/powerpoint/2012/main" xmlns:mc="http://schemas.openxmlformats.org/markup-compatibility/2006" type="twoObj" preserve="1">
   <p:cSld name="Title, 2 Content">
@@ -3766,6 +3970,1258 @@
           <a:xfrm>
             <a:off x="4669200" y="2079000"/>
             <a:ext cx="3751920" cy="2260800"/>
+          </a:xfrm>
+          <a:prstGeom prst="rect">
+            <a:avLst/>
+          </a:prstGeom>
+        </p:spPr>
+        <p:txBody>
+          <a:bodyPr lIns="0" rIns="0" tIns="0" bIns="0">
+            <a:normAutofit/>
+          </a:bodyPr>
+          <a:p>
+            <a:endParaRPr b="0" lang="en-US" sz="1400" spc="-1" strike="noStrike">
+              <a:solidFill>
+                <a:srgbClr val="000000"/>
+              </a:solidFill>
+              <a:latin typeface="Arial"/>
+            </a:endParaRPr>
+          </a:p>
+        </p:txBody>
+      </p:sp>
+    </p:spTree>
+  </p:cSld>
+</p:sldLayout>
+</file>
+
+<file path=ppt/slideLayouts/slideLayout40.xml><?xml version="1.0" encoding="utf-8"?>
+<p:sldLayout xmlns:a="http://schemas.openxmlformats.org/drawingml/2006/main" xmlns:p="http://schemas.openxmlformats.org/presentationml/2006/main" xmlns:r="http://schemas.openxmlformats.org/officeDocument/2006/relationships" xmlns:p14="http://schemas.microsoft.com/office/powerpoint/2010/main" xmlns:p15="http://schemas.microsoft.com/office/powerpoint/2012/main" xmlns:mc="http://schemas.openxmlformats.org/markup-compatibility/2006" type="twoObj" preserve="1">
+  <p:cSld name="Title, 2 Content">
+    <p:spTree>
+      <p:nvGrpSpPr>
+        <p:cNvPr id="1" name=""/>
+        <p:cNvGrpSpPr/>
+        <p:nvPr/>
+      </p:nvGrpSpPr>
+      <p:grpSpPr>
+        <a:xfrm>
+          <a:off x="0" y="0"/>
+          <a:ext cx="0" cy="0"/>
+          <a:chOff x="0" y="0"/>
+          <a:chExt cx="0" cy="0"/>
+        </a:xfrm>
+      </p:grpSpPr>
+      <p:sp>
+        <p:nvSpPr>
+          <p:cNvPr id="139" name="PlaceHolder 1"/>
+          <p:cNvSpPr>
+            <a:spLocks noGrp="1"/>
+          </p:cNvSpPr>
+          <p:nvPr>
+            <p:ph type="title"/>
+          </p:nvPr>
+        </p:nvSpPr>
+        <p:spPr>
+          <a:xfrm>
+            <a:off x="729360" y="1318680"/>
+            <a:ext cx="7688520" cy="534960"/>
+          </a:xfrm>
+          <a:prstGeom prst="rect">
+            <a:avLst/>
+          </a:prstGeom>
+        </p:spPr>
+        <p:txBody>
+          <a:bodyPr lIns="0" rIns="0" tIns="0" bIns="0" anchor="ctr">
+            <a:noAutofit/>
+          </a:bodyPr>
+          <a:p>
+            <a:endParaRPr b="0" lang="en-US" sz="1400" spc="-1" strike="noStrike">
+              <a:solidFill>
+                <a:srgbClr val="000000"/>
+              </a:solidFill>
+              <a:latin typeface="Arial"/>
+            </a:endParaRPr>
+          </a:p>
+        </p:txBody>
+      </p:sp>
+      <p:sp>
+        <p:nvSpPr>
+          <p:cNvPr id="140" name="PlaceHolder 2"/>
+          <p:cNvSpPr>
+            <a:spLocks noGrp="1"/>
+          </p:cNvSpPr>
+          <p:nvPr>
+            <p:ph type="body"/>
+          </p:nvPr>
+        </p:nvSpPr>
+        <p:spPr>
+          <a:xfrm>
+            <a:off x="729360" y="2079000"/>
+            <a:ext cx="3751920" cy="2260800"/>
+          </a:xfrm>
+          <a:prstGeom prst="rect">
+            <a:avLst/>
+          </a:prstGeom>
+        </p:spPr>
+        <p:txBody>
+          <a:bodyPr lIns="0" rIns="0" tIns="0" bIns="0">
+            <a:normAutofit/>
+          </a:bodyPr>
+          <a:p>
+            <a:endParaRPr b="0" lang="en-US" sz="1400" spc="-1" strike="noStrike">
+              <a:solidFill>
+                <a:srgbClr val="000000"/>
+              </a:solidFill>
+              <a:latin typeface="Arial"/>
+            </a:endParaRPr>
+          </a:p>
+        </p:txBody>
+      </p:sp>
+      <p:sp>
+        <p:nvSpPr>
+          <p:cNvPr id="141" name="PlaceHolder 3"/>
+          <p:cNvSpPr>
+            <a:spLocks noGrp="1"/>
+          </p:cNvSpPr>
+          <p:nvPr>
+            <p:ph type="body"/>
+          </p:nvPr>
+        </p:nvSpPr>
+        <p:spPr>
+          <a:xfrm>
+            <a:off x="4669200" y="2079000"/>
+            <a:ext cx="3751920" cy="2260800"/>
+          </a:xfrm>
+          <a:prstGeom prst="rect">
+            <a:avLst/>
+          </a:prstGeom>
+        </p:spPr>
+        <p:txBody>
+          <a:bodyPr lIns="0" rIns="0" tIns="0" bIns="0">
+            <a:normAutofit/>
+          </a:bodyPr>
+          <a:p>
+            <a:endParaRPr b="0" lang="en-US" sz="1400" spc="-1" strike="noStrike">
+              <a:solidFill>
+                <a:srgbClr val="000000"/>
+              </a:solidFill>
+              <a:latin typeface="Arial"/>
+            </a:endParaRPr>
+          </a:p>
+        </p:txBody>
+      </p:sp>
+    </p:spTree>
+  </p:cSld>
+</p:sldLayout>
+</file>
+
+<file path=ppt/slideLayouts/slideLayout41.xml><?xml version="1.0" encoding="utf-8"?>
+<p:sldLayout xmlns:a="http://schemas.openxmlformats.org/drawingml/2006/main" xmlns:p="http://schemas.openxmlformats.org/presentationml/2006/main" xmlns:r="http://schemas.openxmlformats.org/officeDocument/2006/relationships" xmlns:p14="http://schemas.microsoft.com/office/powerpoint/2010/main" xmlns:p15="http://schemas.microsoft.com/office/powerpoint/2012/main" xmlns:mc="http://schemas.openxmlformats.org/markup-compatibility/2006" type="titleOnly" preserve="1">
+  <p:cSld name="Title Only">
+    <p:spTree>
+      <p:nvGrpSpPr>
+        <p:cNvPr id="1" name=""/>
+        <p:cNvGrpSpPr/>
+        <p:nvPr/>
+      </p:nvGrpSpPr>
+      <p:grpSpPr>
+        <a:xfrm>
+          <a:off x="0" y="0"/>
+          <a:ext cx="0" cy="0"/>
+          <a:chOff x="0" y="0"/>
+          <a:chExt cx="0" cy="0"/>
+        </a:xfrm>
+      </p:grpSpPr>
+      <p:sp>
+        <p:nvSpPr>
+          <p:cNvPr id="142" name="PlaceHolder 1"/>
+          <p:cNvSpPr>
+            <a:spLocks noGrp="1"/>
+          </p:cNvSpPr>
+          <p:nvPr>
+            <p:ph type="title"/>
+          </p:nvPr>
+        </p:nvSpPr>
+        <p:spPr>
+          <a:xfrm>
+            <a:off x="729360" y="1318680"/>
+            <a:ext cx="7688520" cy="534960"/>
+          </a:xfrm>
+          <a:prstGeom prst="rect">
+            <a:avLst/>
+          </a:prstGeom>
+        </p:spPr>
+        <p:txBody>
+          <a:bodyPr lIns="0" rIns="0" tIns="0" bIns="0" anchor="ctr">
+            <a:noAutofit/>
+          </a:bodyPr>
+          <a:p>
+            <a:endParaRPr b="0" lang="en-US" sz="1400" spc="-1" strike="noStrike">
+              <a:solidFill>
+                <a:srgbClr val="000000"/>
+              </a:solidFill>
+              <a:latin typeface="Arial"/>
+            </a:endParaRPr>
+          </a:p>
+        </p:txBody>
+      </p:sp>
+    </p:spTree>
+  </p:cSld>
+</p:sldLayout>
+</file>
+
+<file path=ppt/slideLayouts/slideLayout42.xml><?xml version="1.0" encoding="utf-8"?>
+<p:sldLayout xmlns:a="http://schemas.openxmlformats.org/drawingml/2006/main" xmlns:p="http://schemas.openxmlformats.org/presentationml/2006/main" xmlns:r="http://schemas.openxmlformats.org/officeDocument/2006/relationships" xmlns:p14="http://schemas.microsoft.com/office/powerpoint/2010/main" xmlns:p15="http://schemas.microsoft.com/office/powerpoint/2012/main" xmlns:mc="http://schemas.openxmlformats.org/markup-compatibility/2006" type="objOnly" preserve="1">
+  <p:cSld name="Centered Text">
+    <p:spTree>
+      <p:nvGrpSpPr>
+        <p:cNvPr id="1" name=""/>
+        <p:cNvGrpSpPr/>
+        <p:nvPr/>
+      </p:nvGrpSpPr>
+      <p:grpSpPr>
+        <a:xfrm>
+          <a:off x="0" y="0"/>
+          <a:ext cx="0" cy="0"/>
+          <a:chOff x="0" y="0"/>
+          <a:chExt cx="0" cy="0"/>
+        </a:xfrm>
+      </p:grpSpPr>
+      <p:sp>
+        <p:nvSpPr>
+          <p:cNvPr id="143" name="PlaceHolder 1"/>
+          <p:cNvSpPr>
+            <a:spLocks noGrp="1"/>
+          </p:cNvSpPr>
+          <p:nvPr>
+            <p:ph type="subTitle"/>
+          </p:nvPr>
+        </p:nvSpPr>
+        <p:spPr>
+          <a:xfrm>
+            <a:off x="729360" y="1318680"/>
+            <a:ext cx="7688520" cy="2481120"/>
+          </a:xfrm>
+          <a:prstGeom prst="rect">
+            <a:avLst/>
+          </a:prstGeom>
+        </p:spPr>
+        <p:txBody>
+          <a:bodyPr lIns="0" rIns="0" tIns="0" bIns="0" anchor="ctr">
+            <a:noAutofit/>
+          </a:bodyPr>
+          <a:p>
+            <a:pPr algn="ctr"/>
+            <a:endParaRPr b="0" lang="en-US" sz="3200" spc="-1" strike="noStrike">
+              <a:latin typeface="Arial"/>
+            </a:endParaRPr>
+          </a:p>
+        </p:txBody>
+      </p:sp>
+    </p:spTree>
+  </p:cSld>
+</p:sldLayout>
+</file>
+
+<file path=ppt/slideLayouts/slideLayout43.xml><?xml version="1.0" encoding="utf-8"?>
+<p:sldLayout xmlns:a="http://schemas.openxmlformats.org/drawingml/2006/main" xmlns:p="http://schemas.openxmlformats.org/presentationml/2006/main" xmlns:r="http://schemas.openxmlformats.org/officeDocument/2006/relationships" xmlns:p14="http://schemas.microsoft.com/office/powerpoint/2010/main" xmlns:p15="http://schemas.microsoft.com/office/powerpoint/2012/main" xmlns:mc="http://schemas.openxmlformats.org/markup-compatibility/2006" type="twoObjAndObj" preserve="1">
+  <p:cSld name="Title, 2 Content and Content">
+    <p:spTree>
+      <p:nvGrpSpPr>
+        <p:cNvPr id="1" name=""/>
+        <p:cNvGrpSpPr/>
+        <p:nvPr/>
+      </p:nvGrpSpPr>
+      <p:grpSpPr>
+        <a:xfrm>
+          <a:off x="0" y="0"/>
+          <a:ext cx="0" cy="0"/>
+          <a:chOff x="0" y="0"/>
+          <a:chExt cx="0" cy="0"/>
+        </a:xfrm>
+      </p:grpSpPr>
+      <p:sp>
+        <p:nvSpPr>
+          <p:cNvPr id="144" name="PlaceHolder 1"/>
+          <p:cNvSpPr>
+            <a:spLocks noGrp="1"/>
+          </p:cNvSpPr>
+          <p:nvPr>
+            <p:ph type="title"/>
+          </p:nvPr>
+        </p:nvSpPr>
+        <p:spPr>
+          <a:xfrm>
+            <a:off x="729360" y="1318680"/>
+            <a:ext cx="7688520" cy="534960"/>
+          </a:xfrm>
+          <a:prstGeom prst="rect">
+            <a:avLst/>
+          </a:prstGeom>
+        </p:spPr>
+        <p:txBody>
+          <a:bodyPr lIns="0" rIns="0" tIns="0" bIns="0" anchor="ctr">
+            <a:noAutofit/>
+          </a:bodyPr>
+          <a:p>
+            <a:endParaRPr b="0" lang="en-US" sz="1400" spc="-1" strike="noStrike">
+              <a:solidFill>
+                <a:srgbClr val="000000"/>
+              </a:solidFill>
+              <a:latin typeface="Arial"/>
+            </a:endParaRPr>
+          </a:p>
+        </p:txBody>
+      </p:sp>
+      <p:sp>
+        <p:nvSpPr>
+          <p:cNvPr id="145" name="PlaceHolder 2"/>
+          <p:cNvSpPr>
+            <a:spLocks noGrp="1"/>
+          </p:cNvSpPr>
+          <p:nvPr>
+            <p:ph type="body"/>
+          </p:nvPr>
+        </p:nvSpPr>
+        <p:spPr>
+          <a:xfrm>
+            <a:off x="729360" y="2079000"/>
+            <a:ext cx="3751920" cy="1078200"/>
+          </a:xfrm>
+          <a:prstGeom prst="rect">
+            <a:avLst/>
+          </a:prstGeom>
+        </p:spPr>
+        <p:txBody>
+          <a:bodyPr lIns="0" rIns="0" tIns="0" bIns="0">
+            <a:normAutofit/>
+          </a:bodyPr>
+          <a:p>
+            <a:endParaRPr b="0" lang="en-US" sz="1400" spc="-1" strike="noStrike">
+              <a:solidFill>
+                <a:srgbClr val="000000"/>
+              </a:solidFill>
+              <a:latin typeface="Arial"/>
+            </a:endParaRPr>
+          </a:p>
+        </p:txBody>
+      </p:sp>
+      <p:sp>
+        <p:nvSpPr>
+          <p:cNvPr id="146" name="PlaceHolder 3"/>
+          <p:cNvSpPr>
+            <a:spLocks noGrp="1"/>
+          </p:cNvSpPr>
+          <p:nvPr>
+            <p:ph type="body"/>
+          </p:nvPr>
+        </p:nvSpPr>
+        <p:spPr>
+          <a:xfrm>
+            <a:off x="4669200" y="2079000"/>
+            <a:ext cx="3751920" cy="2260800"/>
+          </a:xfrm>
+          <a:prstGeom prst="rect">
+            <a:avLst/>
+          </a:prstGeom>
+        </p:spPr>
+        <p:txBody>
+          <a:bodyPr lIns="0" rIns="0" tIns="0" bIns="0">
+            <a:normAutofit/>
+          </a:bodyPr>
+          <a:p>
+            <a:endParaRPr b="0" lang="en-US" sz="1400" spc="-1" strike="noStrike">
+              <a:solidFill>
+                <a:srgbClr val="000000"/>
+              </a:solidFill>
+              <a:latin typeface="Arial"/>
+            </a:endParaRPr>
+          </a:p>
+        </p:txBody>
+      </p:sp>
+      <p:sp>
+        <p:nvSpPr>
+          <p:cNvPr id="147" name="PlaceHolder 4"/>
+          <p:cNvSpPr>
+            <a:spLocks noGrp="1"/>
+          </p:cNvSpPr>
+          <p:nvPr>
+            <p:ph type="body"/>
+          </p:nvPr>
+        </p:nvSpPr>
+        <p:spPr>
+          <a:xfrm>
+            <a:off x="729360" y="3260160"/>
+            <a:ext cx="3751920" cy="1078200"/>
+          </a:xfrm>
+          <a:prstGeom prst="rect">
+            <a:avLst/>
+          </a:prstGeom>
+        </p:spPr>
+        <p:txBody>
+          <a:bodyPr lIns="0" rIns="0" tIns="0" bIns="0">
+            <a:normAutofit/>
+          </a:bodyPr>
+          <a:p>
+            <a:endParaRPr b="0" lang="en-US" sz="1400" spc="-1" strike="noStrike">
+              <a:solidFill>
+                <a:srgbClr val="000000"/>
+              </a:solidFill>
+              <a:latin typeface="Arial"/>
+            </a:endParaRPr>
+          </a:p>
+        </p:txBody>
+      </p:sp>
+    </p:spTree>
+  </p:cSld>
+</p:sldLayout>
+</file>
+
+<file path=ppt/slideLayouts/slideLayout44.xml><?xml version="1.0" encoding="utf-8"?>
+<p:sldLayout xmlns:a="http://schemas.openxmlformats.org/drawingml/2006/main" xmlns:p="http://schemas.openxmlformats.org/presentationml/2006/main" xmlns:r="http://schemas.openxmlformats.org/officeDocument/2006/relationships" xmlns:p14="http://schemas.microsoft.com/office/powerpoint/2010/main" xmlns:p15="http://schemas.microsoft.com/office/powerpoint/2012/main" xmlns:mc="http://schemas.openxmlformats.org/markup-compatibility/2006" type="objAndTwoObj" preserve="1">
+  <p:cSld name="Title Content and 2 Content">
+    <p:spTree>
+      <p:nvGrpSpPr>
+        <p:cNvPr id="1" name=""/>
+        <p:cNvGrpSpPr/>
+        <p:nvPr/>
+      </p:nvGrpSpPr>
+      <p:grpSpPr>
+        <a:xfrm>
+          <a:off x="0" y="0"/>
+          <a:ext cx="0" cy="0"/>
+          <a:chOff x="0" y="0"/>
+          <a:chExt cx="0" cy="0"/>
+        </a:xfrm>
+      </p:grpSpPr>
+      <p:sp>
+        <p:nvSpPr>
+          <p:cNvPr id="148" name="PlaceHolder 1"/>
+          <p:cNvSpPr>
+            <a:spLocks noGrp="1"/>
+          </p:cNvSpPr>
+          <p:nvPr>
+            <p:ph type="title"/>
+          </p:nvPr>
+        </p:nvSpPr>
+        <p:spPr>
+          <a:xfrm>
+            <a:off x="729360" y="1318680"/>
+            <a:ext cx="7688520" cy="534960"/>
+          </a:xfrm>
+          <a:prstGeom prst="rect">
+            <a:avLst/>
+          </a:prstGeom>
+        </p:spPr>
+        <p:txBody>
+          <a:bodyPr lIns="0" rIns="0" tIns="0" bIns="0" anchor="ctr">
+            <a:noAutofit/>
+          </a:bodyPr>
+          <a:p>
+            <a:endParaRPr b="0" lang="en-US" sz="1400" spc="-1" strike="noStrike">
+              <a:solidFill>
+                <a:srgbClr val="000000"/>
+              </a:solidFill>
+              <a:latin typeface="Arial"/>
+            </a:endParaRPr>
+          </a:p>
+        </p:txBody>
+      </p:sp>
+      <p:sp>
+        <p:nvSpPr>
+          <p:cNvPr id="149" name="PlaceHolder 2"/>
+          <p:cNvSpPr>
+            <a:spLocks noGrp="1"/>
+          </p:cNvSpPr>
+          <p:nvPr>
+            <p:ph type="body"/>
+          </p:nvPr>
+        </p:nvSpPr>
+        <p:spPr>
+          <a:xfrm>
+            <a:off x="729360" y="2079000"/>
+            <a:ext cx="3751920" cy="2260800"/>
+          </a:xfrm>
+          <a:prstGeom prst="rect">
+            <a:avLst/>
+          </a:prstGeom>
+        </p:spPr>
+        <p:txBody>
+          <a:bodyPr lIns="0" rIns="0" tIns="0" bIns="0">
+            <a:normAutofit/>
+          </a:bodyPr>
+          <a:p>
+            <a:endParaRPr b="0" lang="en-US" sz="1400" spc="-1" strike="noStrike">
+              <a:solidFill>
+                <a:srgbClr val="000000"/>
+              </a:solidFill>
+              <a:latin typeface="Arial"/>
+            </a:endParaRPr>
+          </a:p>
+        </p:txBody>
+      </p:sp>
+      <p:sp>
+        <p:nvSpPr>
+          <p:cNvPr id="150" name="PlaceHolder 3"/>
+          <p:cNvSpPr>
+            <a:spLocks noGrp="1"/>
+          </p:cNvSpPr>
+          <p:nvPr>
+            <p:ph type="body"/>
+          </p:nvPr>
+        </p:nvSpPr>
+        <p:spPr>
+          <a:xfrm>
+            <a:off x="4669200" y="2079000"/>
+            <a:ext cx="3751920" cy="1078200"/>
+          </a:xfrm>
+          <a:prstGeom prst="rect">
+            <a:avLst/>
+          </a:prstGeom>
+        </p:spPr>
+        <p:txBody>
+          <a:bodyPr lIns="0" rIns="0" tIns="0" bIns="0">
+            <a:normAutofit/>
+          </a:bodyPr>
+          <a:p>
+            <a:endParaRPr b="0" lang="en-US" sz="1400" spc="-1" strike="noStrike">
+              <a:solidFill>
+                <a:srgbClr val="000000"/>
+              </a:solidFill>
+              <a:latin typeface="Arial"/>
+            </a:endParaRPr>
+          </a:p>
+        </p:txBody>
+      </p:sp>
+      <p:sp>
+        <p:nvSpPr>
+          <p:cNvPr id="151" name="PlaceHolder 4"/>
+          <p:cNvSpPr>
+            <a:spLocks noGrp="1"/>
+          </p:cNvSpPr>
+          <p:nvPr>
+            <p:ph type="body"/>
+          </p:nvPr>
+        </p:nvSpPr>
+        <p:spPr>
+          <a:xfrm>
+            <a:off x="4669200" y="3260160"/>
+            <a:ext cx="3751920" cy="1078200"/>
+          </a:xfrm>
+          <a:prstGeom prst="rect">
+            <a:avLst/>
+          </a:prstGeom>
+        </p:spPr>
+        <p:txBody>
+          <a:bodyPr lIns="0" rIns="0" tIns="0" bIns="0">
+            <a:normAutofit/>
+          </a:bodyPr>
+          <a:p>
+            <a:endParaRPr b="0" lang="en-US" sz="1400" spc="-1" strike="noStrike">
+              <a:solidFill>
+                <a:srgbClr val="000000"/>
+              </a:solidFill>
+              <a:latin typeface="Arial"/>
+            </a:endParaRPr>
+          </a:p>
+        </p:txBody>
+      </p:sp>
+    </p:spTree>
+  </p:cSld>
+</p:sldLayout>
+</file>
+
+<file path=ppt/slideLayouts/slideLayout45.xml><?xml version="1.0" encoding="utf-8"?>
+<p:sldLayout xmlns:a="http://schemas.openxmlformats.org/drawingml/2006/main" xmlns:p="http://schemas.openxmlformats.org/presentationml/2006/main" xmlns:r="http://schemas.openxmlformats.org/officeDocument/2006/relationships" xmlns:p14="http://schemas.microsoft.com/office/powerpoint/2010/main" xmlns:p15="http://schemas.microsoft.com/office/powerpoint/2012/main" xmlns:mc="http://schemas.openxmlformats.org/markup-compatibility/2006" type="twoObjOverTx" preserve="1">
+  <p:cSld name="Title, 2 Content over Content">
+    <p:spTree>
+      <p:nvGrpSpPr>
+        <p:cNvPr id="1" name=""/>
+        <p:cNvGrpSpPr/>
+        <p:nvPr/>
+      </p:nvGrpSpPr>
+      <p:grpSpPr>
+        <a:xfrm>
+          <a:off x="0" y="0"/>
+          <a:ext cx="0" cy="0"/>
+          <a:chOff x="0" y="0"/>
+          <a:chExt cx="0" cy="0"/>
+        </a:xfrm>
+      </p:grpSpPr>
+      <p:sp>
+        <p:nvSpPr>
+          <p:cNvPr id="152" name="PlaceHolder 1"/>
+          <p:cNvSpPr>
+            <a:spLocks noGrp="1"/>
+          </p:cNvSpPr>
+          <p:nvPr>
+            <p:ph type="title"/>
+          </p:nvPr>
+        </p:nvSpPr>
+        <p:spPr>
+          <a:xfrm>
+            <a:off x="729360" y="1318680"/>
+            <a:ext cx="7688520" cy="534960"/>
+          </a:xfrm>
+          <a:prstGeom prst="rect">
+            <a:avLst/>
+          </a:prstGeom>
+        </p:spPr>
+        <p:txBody>
+          <a:bodyPr lIns="0" rIns="0" tIns="0" bIns="0" anchor="ctr">
+            <a:noAutofit/>
+          </a:bodyPr>
+          <a:p>
+            <a:endParaRPr b="0" lang="en-US" sz="1400" spc="-1" strike="noStrike">
+              <a:solidFill>
+                <a:srgbClr val="000000"/>
+              </a:solidFill>
+              <a:latin typeface="Arial"/>
+            </a:endParaRPr>
+          </a:p>
+        </p:txBody>
+      </p:sp>
+      <p:sp>
+        <p:nvSpPr>
+          <p:cNvPr id="153" name="PlaceHolder 2"/>
+          <p:cNvSpPr>
+            <a:spLocks noGrp="1"/>
+          </p:cNvSpPr>
+          <p:nvPr>
+            <p:ph type="body"/>
+          </p:nvPr>
+        </p:nvSpPr>
+        <p:spPr>
+          <a:xfrm>
+            <a:off x="729360" y="2079000"/>
+            <a:ext cx="3751920" cy="1078200"/>
+          </a:xfrm>
+          <a:prstGeom prst="rect">
+            <a:avLst/>
+          </a:prstGeom>
+        </p:spPr>
+        <p:txBody>
+          <a:bodyPr lIns="0" rIns="0" tIns="0" bIns="0">
+            <a:normAutofit/>
+          </a:bodyPr>
+          <a:p>
+            <a:endParaRPr b="0" lang="en-US" sz="1400" spc="-1" strike="noStrike">
+              <a:solidFill>
+                <a:srgbClr val="000000"/>
+              </a:solidFill>
+              <a:latin typeface="Arial"/>
+            </a:endParaRPr>
+          </a:p>
+        </p:txBody>
+      </p:sp>
+      <p:sp>
+        <p:nvSpPr>
+          <p:cNvPr id="154" name="PlaceHolder 3"/>
+          <p:cNvSpPr>
+            <a:spLocks noGrp="1"/>
+          </p:cNvSpPr>
+          <p:nvPr>
+            <p:ph type="body"/>
+          </p:nvPr>
+        </p:nvSpPr>
+        <p:spPr>
+          <a:xfrm>
+            <a:off x="4669200" y="2079000"/>
+            <a:ext cx="3751920" cy="1078200"/>
+          </a:xfrm>
+          <a:prstGeom prst="rect">
+            <a:avLst/>
+          </a:prstGeom>
+        </p:spPr>
+        <p:txBody>
+          <a:bodyPr lIns="0" rIns="0" tIns="0" bIns="0">
+            <a:normAutofit/>
+          </a:bodyPr>
+          <a:p>
+            <a:endParaRPr b="0" lang="en-US" sz="1400" spc="-1" strike="noStrike">
+              <a:solidFill>
+                <a:srgbClr val="000000"/>
+              </a:solidFill>
+              <a:latin typeface="Arial"/>
+            </a:endParaRPr>
+          </a:p>
+        </p:txBody>
+      </p:sp>
+      <p:sp>
+        <p:nvSpPr>
+          <p:cNvPr id="155" name="PlaceHolder 4"/>
+          <p:cNvSpPr>
+            <a:spLocks noGrp="1"/>
+          </p:cNvSpPr>
+          <p:nvPr>
+            <p:ph type="body"/>
+          </p:nvPr>
+        </p:nvSpPr>
+        <p:spPr>
+          <a:xfrm>
+            <a:off x="729360" y="3260160"/>
+            <a:ext cx="7688520" cy="1078200"/>
+          </a:xfrm>
+          <a:prstGeom prst="rect">
+            <a:avLst/>
+          </a:prstGeom>
+        </p:spPr>
+        <p:txBody>
+          <a:bodyPr lIns="0" rIns="0" tIns="0" bIns="0">
+            <a:normAutofit/>
+          </a:bodyPr>
+          <a:p>
+            <a:endParaRPr b="0" lang="en-US" sz="1400" spc="-1" strike="noStrike">
+              <a:solidFill>
+                <a:srgbClr val="000000"/>
+              </a:solidFill>
+              <a:latin typeface="Arial"/>
+            </a:endParaRPr>
+          </a:p>
+        </p:txBody>
+      </p:sp>
+    </p:spTree>
+  </p:cSld>
+</p:sldLayout>
+</file>
+
+<file path=ppt/slideLayouts/slideLayout46.xml><?xml version="1.0" encoding="utf-8"?>
+<p:sldLayout xmlns:a="http://schemas.openxmlformats.org/drawingml/2006/main" xmlns:p="http://schemas.openxmlformats.org/presentationml/2006/main" xmlns:r="http://schemas.openxmlformats.org/officeDocument/2006/relationships" xmlns:p14="http://schemas.microsoft.com/office/powerpoint/2010/main" xmlns:p15="http://schemas.microsoft.com/office/powerpoint/2012/main" xmlns:mc="http://schemas.openxmlformats.org/markup-compatibility/2006" type="objOverTx" preserve="1">
+  <p:cSld name="Title, Content over Content">
+    <p:spTree>
+      <p:nvGrpSpPr>
+        <p:cNvPr id="1" name=""/>
+        <p:cNvGrpSpPr/>
+        <p:nvPr/>
+      </p:nvGrpSpPr>
+      <p:grpSpPr>
+        <a:xfrm>
+          <a:off x="0" y="0"/>
+          <a:ext cx="0" cy="0"/>
+          <a:chOff x="0" y="0"/>
+          <a:chExt cx="0" cy="0"/>
+        </a:xfrm>
+      </p:grpSpPr>
+      <p:sp>
+        <p:nvSpPr>
+          <p:cNvPr id="156" name="PlaceHolder 1"/>
+          <p:cNvSpPr>
+            <a:spLocks noGrp="1"/>
+          </p:cNvSpPr>
+          <p:nvPr>
+            <p:ph type="title"/>
+          </p:nvPr>
+        </p:nvSpPr>
+        <p:spPr>
+          <a:xfrm>
+            <a:off x="729360" y="1318680"/>
+            <a:ext cx="7688520" cy="534960"/>
+          </a:xfrm>
+          <a:prstGeom prst="rect">
+            <a:avLst/>
+          </a:prstGeom>
+        </p:spPr>
+        <p:txBody>
+          <a:bodyPr lIns="0" rIns="0" tIns="0" bIns="0" anchor="ctr">
+            <a:noAutofit/>
+          </a:bodyPr>
+          <a:p>
+            <a:endParaRPr b="0" lang="en-US" sz="1400" spc="-1" strike="noStrike">
+              <a:solidFill>
+                <a:srgbClr val="000000"/>
+              </a:solidFill>
+              <a:latin typeface="Arial"/>
+            </a:endParaRPr>
+          </a:p>
+        </p:txBody>
+      </p:sp>
+      <p:sp>
+        <p:nvSpPr>
+          <p:cNvPr id="157" name="PlaceHolder 2"/>
+          <p:cNvSpPr>
+            <a:spLocks noGrp="1"/>
+          </p:cNvSpPr>
+          <p:nvPr>
+            <p:ph type="body"/>
+          </p:nvPr>
+        </p:nvSpPr>
+        <p:spPr>
+          <a:xfrm>
+            <a:off x="729360" y="2079000"/>
+            <a:ext cx="7688520" cy="1078200"/>
+          </a:xfrm>
+          <a:prstGeom prst="rect">
+            <a:avLst/>
+          </a:prstGeom>
+        </p:spPr>
+        <p:txBody>
+          <a:bodyPr lIns="0" rIns="0" tIns="0" bIns="0">
+            <a:normAutofit/>
+          </a:bodyPr>
+          <a:p>
+            <a:endParaRPr b="0" lang="en-US" sz="1400" spc="-1" strike="noStrike">
+              <a:solidFill>
+                <a:srgbClr val="000000"/>
+              </a:solidFill>
+              <a:latin typeface="Arial"/>
+            </a:endParaRPr>
+          </a:p>
+        </p:txBody>
+      </p:sp>
+      <p:sp>
+        <p:nvSpPr>
+          <p:cNvPr id="158" name="PlaceHolder 3"/>
+          <p:cNvSpPr>
+            <a:spLocks noGrp="1"/>
+          </p:cNvSpPr>
+          <p:nvPr>
+            <p:ph type="body"/>
+          </p:nvPr>
+        </p:nvSpPr>
+        <p:spPr>
+          <a:xfrm>
+            <a:off x="729360" y="3260160"/>
+            <a:ext cx="7688520" cy="1078200"/>
+          </a:xfrm>
+          <a:prstGeom prst="rect">
+            <a:avLst/>
+          </a:prstGeom>
+        </p:spPr>
+        <p:txBody>
+          <a:bodyPr lIns="0" rIns="0" tIns="0" bIns="0">
+            <a:normAutofit/>
+          </a:bodyPr>
+          <a:p>
+            <a:endParaRPr b="0" lang="en-US" sz="1400" spc="-1" strike="noStrike">
+              <a:solidFill>
+                <a:srgbClr val="000000"/>
+              </a:solidFill>
+              <a:latin typeface="Arial"/>
+            </a:endParaRPr>
+          </a:p>
+        </p:txBody>
+      </p:sp>
+    </p:spTree>
+  </p:cSld>
+</p:sldLayout>
+</file>
+
+<file path=ppt/slideLayouts/slideLayout47.xml><?xml version="1.0" encoding="utf-8"?>
+<p:sldLayout xmlns:a="http://schemas.openxmlformats.org/drawingml/2006/main" xmlns:p="http://schemas.openxmlformats.org/presentationml/2006/main" xmlns:r="http://schemas.openxmlformats.org/officeDocument/2006/relationships" xmlns:p14="http://schemas.microsoft.com/office/powerpoint/2010/main" xmlns:p15="http://schemas.microsoft.com/office/powerpoint/2012/main" xmlns:mc="http://schemas.openxmlformats.org/markup-compatibility/2006" type="fourObj" preserve="1">
+  <p:cSld name="Title, 4 Content">
+    <p:spTree>
+      <p:nvGrpSpPr>
+        <p:cNvPr id="1" name=""/>
+        <p:cNvGrpSpPr/>
+        <p:nvPr/>
+      </p:nvGrpSpPr>
+      <p:grpSpPr>
+        <a:xfrm>
+          <a:off x="0" y="0"/>
+          <a:ext cx="0" cy="0"/>
+          <a:chOff x="0" y="0"/>
+          <a:chExt cx="0" cy="0"/>
+        </a:xfrm>
+      </p:grpSpPr>
+      <p:sp>
+        <p:nvSpPr>
+          <p:cNvPr id="159" name="PlaceHolder 1"/>
+          <p:cNvSpPr>
+            <a:spLocks noGrp="1"/>
+          </p:cNvSpPr>
+          <p:nvPr>
+            <p:ph type="title"/>
+          </p:nvPr>
+        </p:nvSpPr>
+        <p:spPr>
+          <a:xfrm>
+            <a:off x="729360" y="1318680"/>
+            <a:ext cx="7688520" cy="534960"/>
+          </a:xfrm>
+          <a:prstGeom prst="rect">
+            <a:avLst/>
+          </a:prstGeom>
+        </p:spPr>
+        <p:txBody>
+          <a:bodyPr lIns="0" rIns="0" tIns="0" bIns="0" anchor="ctr">
+            <a:noAutofit/>
+          </a:bodyPr>
+          <a:p>
+            <a:endParaRPr b="0" lang="en-US" sz="1400" spc="-1" strike="noStrike">
+              <a:solidFill>
+                <a:srgbClr val="000000"/>
+              </a:solidFill>
+              <a:latin typeface="Arial"/>
+            </a:endParaRPr>
+          </a:p>
+        </p:txBody>
+      </p:sp>
+      <p:sp>
+        <p:nvSpPr>
+          <p:cNvPr id="160" name="PlaceHolder 2"/>
+          <p:cNvSpPr>
+            <a:spLocks noGrp="1"/>
+          </p:cNvSpPr>
+          <p:nvPr>
+            <p:ph type="body"/>
+          </p:nvPr>
+        </p:nvSpPr>
+        <p:spPr>
+          <a:xfrm>
+            <a:off x="729360" y="2079000"/>
+            <a:ext cx="3751920" cy="1078200"/>
+          </a:xfrm>
+          <a:prstGeom prst="rect">
+            <a:avLst/>
+          </a:prstGeom>
+        </p:spPr>
+        <p:txBody>
+          <a:bodyPr lIns="0" rIns="0" tIns="0" bIns="0">
+            <a:normAutofit/>
+          </a:bodyPr>
+          <a:p>
+            <a:endParaRPr b="0" lang="en-US" sz="1400" spc="-1" strike="noStrike">
+              <a:solidFill>
+                <a:srgbClr val="000000"/>
+              </a:solidFill>
+              <a:latin typeface="Arial"/>
+            </a:endParaRPr>
+          </a:p>
+        </p:txBody>
+      </p:sp>
+      <p:sp>
+        <p:nvSpPr>
+          <p:cNvPr id="161" name="PlaceHolder 3"/>
+          <p:cNvSpPr>
+            <a:spLocks noGrp="1"/>
+          </p:cNvSpPr>
+          <p:nvPr>
+            <p:ph type="body"/>
+          </p:nvPr>
+        </p:nvSpPr>
+        <p:spPr>
+          <a:xfrm>
+            <a:off x="4669200" y="2079000"/>
+            <a:ext cx="3751920" cy="1078200"/>
+          </a:xfrm>
+          <a:prstGeom prst="rect">
+            <a:avLst/>
+          </a:prstGeom>
+        </p:spPr>
+        <p:txBody>
+          <a:bodyPr lIns="0" rIns="0" tIns="0" bIns="0">
+            <a:normAutofit/>
+          </a:bodyPr>
+          <a:p>
+            <a:endParaRPr b="0" lang="en-US" sz="1400" spc="-1" strike="noStrike">
+              <a:solidFill>
+                <a:srgbClr val="000000"/>
+              </a:solidFill>
+              <a:latin typeface="Arial"/>
+            </a:endParaRPr>
+          </a:p>
+        </p:txBody>
+      </p:sp>
+      <p:sp>
+        <p:nvSpPr>
+          <p:cNvPr id="162" name="PlaceHolder 4"/>
+          <p:cNvSpPr>
+            <a:spLocks noGrp="1"/>
+          </p:cNvSpPr>
+          <p:nvPr>
+            <p:ph type="body"/>
+          </p:nvPr>
+        </p:nvSpPr>
+        <p:spPr>
+          <a:xfrm>
+            <a:off x="729360" y="3260160"/>
+            <a:ext cx="3751920" cy="1078200"/>
+          </a:xfrm>
+          <a:prstGeom prst="rect">
+            <a:avLst/>
+          </a:prstGeom>
+        </p:spPr>
+        <p:txBody>
+          <a:bodyPr lIns="0" rIns="0" tIns="0" bIns="0">
+            <a:normAutofit/>
+          </a:bodyPr>
+          <a:p>
+            <a:endParaRPr b="0" lang="en-US" sz="1400" spc="-1" strike="noStrike">
+              <a:solidFill>
+                <a:srgbClr val="000000"/>
+              </a:solidFill>
+              <a:latin typeface="Arial"/>
+            </a:endParaRPr>
+          </a:p>
+        </p:txBody>
+      </p:sp>
+      <p:sp>
+        <p:nvSpPr>
+          <p:cNvPr id="163" name="PlaceHolder 5"/>
+          <p:cNvSpPr>
+            <a:spLocks noGrp="1"/>
+          </p:cNvSpPr>
+          <p:nvPr>
+            <p:ph type="body"/>
+          </p:nvPr>
+        </p:nvSpPr>
+        <p:spPr>
+          <a:xfrm>
+            <a:off x="4669200" y="3260160"/>
+            <a:ext cx="3751920" cy="1078200"/>
+          </a:xfrm>
+          <a:prstGeom prst="rect">
+            <a:avLst/>
+          </a:prstGeom>
+        </p:spPr>
+        <p:txBody>
+          <a:bodyPr lIns="0" rIns="0" tIns="0" bIns="0">
+            <a:normAutofit/>
+          </a:bodyPr>
+          <a:p>
+            <a:endParaRPr b="0" lang="en-US" sz="1400" spc="-1" strike="noStrike">
+              <a:solidFill>
+                <a:srgbClr val="000000"/>
+              </a:solidFill>
+              <a:latin typeface="Arial"/>
+            </a:endParaRPr>
+          </a:p>
+        </p:txBody>
+      </p:sp>
+    </p:spTree>
+  </p:cSld>
+</p:sldLayout>
+</file>
+
+<file path=ppt/slideLayouts/slideLayout48.xml><?xml version="1.0" encoding="utf-8"?>
+<p:sldLayout xmlns:a="http://schemas.openxmlformats.org/drawingml/2006/main" xmlns:p="http://schemas.openxmlformats.org/presentationml/2006/main" xmlns:r="http://schemas.openxmlformats.org/officeDocument/2006/relationships" xmlns:p14="http://schemas.microsoft.com/office/powerpoint/2010/main" xmlns:p15="http://schemas.microsoft.com/office/powerpoint/2012/main" xmlns:mc="http://schemas.openxmlformats.org/markup-compatibility/2006" type="blank" preserve="1">
+  <p:cSld name="Title, 6 Content">
+    <p:spTree>
+      <p:nvGrpSpPr>
+        <p:cNvPr id="1" name=""/>
+        <p:cNvGrpSpPr/>
+        <p:nvPr/>
+      </p:nvGrpSpPr>
+      <p:grpSpPr>
+        <a:xfrm>
+          <a:off x="0" y="0"/>
+          <a:ext cx="0" cy="0"/>
+          <a:chOff x="0" y="0"/>
+          <a:chExt cx="0" cy="0"/>
+        </a:xfrm>
+      </p:grpSpPr>
+      <p:sp>
+        <p:nvSpPr>
+          <p:cNvPr id="164" name="PlaceHolder 1"/>
+          <p:cNvSpPr>
+            <a:spLocks noGrp="1"/>
+          </p:cNvSpPr>
+          <p:nvPr>
+            <p:ph type="title"/>
+          </p:nvPr>
+        </p:nvSpPr>
+        <p:spPr>
+          <a:xfrm>
+            <a:off x="729360" y="1318680"/>
+            <a:ext cx="7688520" cy="534960"/>
+          </a:xfrm>
+          <a:prstGeom prst="rect">
+            <a:avLst/>
+          </a:prstGeom>
+        </p:spPr>
+        <p:txBody>
+          <a:bodyPr lIns="0" rIns="0" tIns="0" bIns="0" anchor="ctr">
+            <a:noAutofit/>
+          </a:bodyPr>
+          <a:p>
+            <a:endParaRPr b="0" lang="en-US" sz="1400" spc="-1" strike="noStrike">
+              <a:solidFill>
+                <a:srgbClr val="000000"/>
+              </a:solidFill>
+              <a:latin typeface="Arial"/>
+            </a:endParaRPr>
+          </a:p>
+        </p:txBody>
+      </p:sp>
+      <p:sp>
+        <p:nvSpPr>
+          <p:cNvPr id="165" name="PlaceHolder 2"/>
+          <p:cNvSpPr>
+            <a:spLocks noGrp="1"/>
+          </p:cNvSpPr>
+          <p:nvPr>
+            <p:ph type="body"/>
+          </p:nvPr>
+        </p:nvSpPr>
+        <p:spPr>
+          <a:xfrm>
+            <a:off x="729360" y="2079000"/>
+            <a:ext cx="2475360" cy="1078200"/>
+          </a:xfrm>
+          <a:prstGeom prst="rect">
+            <a:avLst/>
+          </a:prstGeom>
+        </p:spPr>
+        <p:txBody>
+          <a:bodyPr lIns="0" rIns="0" tIns="0" bIns="0">
+            <a:normAutofit/>
+          </a:bodyPr>
+          <a:p>
+            <a:endParaRPr b="0" lang="en-US" sz="1400" spc="-1" strike="noStrike">
+              <a:solidFill>
+                <a:srgbClr val="000000"/>
+              </a:solidFill>
+              <a:latin typeface="Arial"/>
+            </a:endParaRPr>
+          </a:p>
+        </p:txBody>
+      </p:sp>
+      <p:sp>
+        <p:nvSpPr>
+          <p:cNvPr id="166" name="PlaceHolder 3"/>
+          <p:cNvSpPr>
+            <a:spLocks noGrp="1"/>
+          </p:cNvSpPr>
+          <p:nvPr>
+            <p:ph type="body"/>
+          </p:nvPr>
+        </p:nvSpPr>
+        <p:spPr>
+          <a:xfrm>
+            <a:off x="3328920" y="2079000"/>
+            <a:ext cx="2475360" cy="1078200"/>
+          </a:xfrm>
+          <a:prstGeom prst="rect">
+            <a:avLst/>
+          </a:prstGeom>
+        </p:spPr>
+        <p:txBody>
+          <a:bodyPr lIns="0" rIns="0" tIns="0" bIns="0">
+            <a:normAutofit/>
+          </a:bodyPr>
+          <a:p>
+            <a:endParaRPr b="0" lang="en-US" sz="1400" spc="-1" strike="noStrike">
+              <a:solidFill>
+                <a:srgbClr val="000000"/>
+              </a:solidFill>
+              <a:latin typeface="Arial"/>
+            </a:endParaRPr>
+          </a:p>
+        </p:txBody>
+      </p:sp>
+      <p:sp>
+        <p:nvSpPr>
+          <p:cNvPr id="167" name="PlaceHolder 4"/>
+          <p:cNvSpPr>
+            <a:spLocks noGrp="1"/>
+          </p:cNvSpPr>
+          <p:nvPr>
+            <p:ph type="body"/>
+          </p:nvPr>
+        </p:nvSpPr>
+        <p:spPr>
+          <a:xfrm>
+            <a:off x="5928480" y="2079000"/>
+            <a:ext cx="2475360" cy="1078200"/>
+          </a:xfrm>
+          <a:prstGeom prst="rect">
+            <a:avLst/>
+          </a:prstGeom>
+        </p:spPr>
+        <p:txBody>
+          <a:bodyPr lIns="0" rIns="0" tIns="0" bIns="0">
+            <a:normAutofit/>
+          </a:bodyPr>
+          <a:p>
+            <a:endParaRPr b="0" lang="en-US" sz="1400" spc="-1" strike="noStrike">
+              <a:solidFill>
+                <a:srgbClr val="000000"/>
+              </a:solidFill>
+              <a:latin typeface="Arial"/>
+            </a:endParaRPr>
+          </a:p>
+        </p:txBody>
+      </p:sp>
+      <p:sp>
+        <p:nvSpPr>
+          <p:cNvPr id="168" name="PlaceHolder 5"/>
+          <p:cNvSpPr>
+            <a:spLocks noGrp="1"/>
+          </p:cNvSpPr>
+          <p:nvPr>
+            <p:ph type="body"/>
+          </p:nvPr>
+        </p:nvSpPr>
+        <p:spPr>
+          <a:xfrm>
+            <a:off x="729360" y="3260160"/>
+            <a:ext cx="2475360" cy="1078200"/>
+          </a:xfrm>
+          <a:prstGeom prst="rect">
+            <a:avLst/>
+          </a:prstGeom>
+        </p:spPr>
+        <p:txBody>
+          <a:bodyPr lIns="0" rIns="0" tIns="0" bIns="0">
+            <a:normAutofit/>
+          </a:bodyPr>
+          <a:p>
+            <a:endParaRPr b="0" lang="en-US" sz="1400" spc="-1" strike="noStrike">
+              <a:solidFill>
+                <a:srgbClr val="000000"/>
+              </a:solidFill>
+              <a:latin typeface="Arial"/>
+            </a:endParaRPr>
+          </a:p>
+        </p:txBody>
+      </p:sp>
+      <p:sp>
+        <p:nvSpPr>
+          <p:cNvPr id="169" name="PlaceHolder 6"/>
+          <p:cNvSpPr>
+            <a:spLocks noGrp="1"/>
+          </p:cNvSpPr>
+          <p:nvPr>
+            <p:ph type="body"/>
+          </p:nvPr>
+        </p:nvSpPr>
+        <p:spPr>
+          <a:xfrm>
+            <a:off x="3328920" y="3260160"/>
+            <a:ext cx="2475360" cy="1078200"/>
+          </a:xfrm>
+          <a:prstGeom prst="rect">
+            <a:avLst/>
+          </a:prstGeom>
+        </p:spPr>
+        <p:txBody>
+          <a:bodyPr lIns="0" rIns="0" tIns="0" bIns="0">
+            <a:normAutofit/>
+          </a:bodyPr>
+          <a:p>
+            <a:endParaRPr b="0" lang="en-US" sz="1400" spc="-1" strike="noStrike">
+              <a:solidFill>
+                <a:srgbClr val="000000"/>
+              </a:solidFill>
+              <a:latin typeface="Arial"/>
+            </a:endParaRPr>
+          </a:p>
+        </p:txBody>
+      </p:sp>
+      <p:sp>
+        <p:nvSpPr>
+          <p:cNvPr id="170" name="PlaceHolder 7"/>
+          <p:cNvSpPr>
+            <a:spLocks noGrp="1"/>
+          </p:cNvSpPr>
+          <p:nvPr>
+            <p:ph type="body"/>
+          </p:nvPr>
+        </p:nvSpPr>
+        <p:spPr>
+          <a:xfrm>
+            <a:off x="5928480" y="3260160"/>
+            <a:ext cx="2475360" cy="1078200"/>
           </a:xfrm>
           <a:prstGeom prst="rect">
             <a:avLst/>
@@ -4557,7 +6013,7 @@
                 <a:tab algn="l" pos="0"/>
               </a:tabLst>
             </a:pPr>
-            <a:fld id="{5D44DE8E-EBF8-4AD0-89D1-81F809E4DA85}" type="slidenum">
+            <a:fld id="{96A1AFE8-2243-4547-9EF2-42C83730CFD2}" type="slidenum">
               <a:rPr b="0" lang="id" sz="1000" spc="-1" strike="noStrike">
                 <a:solidFill>
                   <a:srgbClr val="595959"/>
@@ -5232,7 +6688,7 @@
                 <a:tab algn="l" pos="0"/>
               </a:tabLst>
             </a:pPr>
-            <a:fld id="{3898FB9D-9266-4BD0-AD20-983844682568}" type="slidenum">
+            <a:fld id="{70ED0C43-98A8-4FA6-BA02-C64FC079ACED}" type="slidenum">
               <a:rPr b="0" lang="id" sz="1000" spc="-1" strike="noStrike">
                 <a:solidFill>
                   <a:srgbClr val="595959"/>
@@ -5437,7 +6893,7 @@
                 <a:tab algn="l" pos="0"/>
               </a:tabLst>
             </a:pPr>
-            <a:fld id="{20013255-C220-48BA-9AFA-89CB7993582D}" type="slidenum">
+            <a:fld id="{E3273675-00A0-48FE-8397-D8AC7F7093D9}" type="slidenum">
               <a:rPr b="0" lang="id" sz="1000" spc="-1" strike="noStrike">
                 <a:solidFill>
                   <a:srgbClr val="ffffff"/>
@@ -5690,6 +7146,460 @@
     <p:sldLayoutId id="2147483684" r:id="rId11"/>
     <p:sldLayoutId id="2147483685" r:id="rId12"/>
     <p:sldLayoutId id="2147483686" r:id="rId13"/>
+  </p:sldLayoutIdLst>
+</p:sldMaster>
+</file>
+
+<file path=ppt/slideMasters/slideMaster4.xml><?xml version="1.0" encoding="utf-8"?>
+<p:sldMaster xmlns:a="http://schemas.openxmlformats.org/drawingml/2006/main" xmlns:p="http://schemas.openxmlformats.org/presentationml/2006/main" xmlns:r="http://schemas.openxmlformats.org/officeDocument/2006/relationships" xmlns:p14="http://schemas.microsoft.com/office/powerpoint/2010/main" xmlns:p15="http://schemas.microsoft.com/office/powerpoint/2012/main" xmlns:mc="http://schemas.openxmlformats.org/markup-compatibility/2006">
+  <p:cSld>
+    <p:bg>
+      <p:bgPr>
+        <a:solidFill>
+          <a:srgbClr val="ffffff"/>
+        </a:solidFill>
+      </p:bgPr>
+    </p:bg>
+    <p:spTree>
+      <p:nvGrpSpPr>
+        <p:cNvPr id="1" name=""/>
+        <p:cNvGrpSpPr/>
+        <p:nvPr/>
+      </p:nvGrpSpPr>
+      <p:grpSpPr>
+        <a:xfrm>
+          <a:off x="0" y="0"/>
+          <a:ext cx="0" cy="0"/>
+          <a:chOff x="0" y="0"/>
+          <a:chExt cx="0" cy="0"/>
+        </a:xfrm>
+      </p:grpSpPr>
+      <p:sp>
+        <p:nvSpPr>
+          <p:cNvPr id="128" name="CustomShape 1"/>
+          <p:cNvSpPr/>
+          <p:nvPr/>
+        </p:nvSpPr>
+        <p:spPr>
+          <a:xfrm>
+            <a:off x="0" y="0"/>
+            <a:ext cx="9143640" cy="487440"/>
+          </a:xfrm>
+          <a:prstGeom prst="rect">
+            <a:avLst/>
+          </a:prstGeom>
+          <a:solidFill>
+            <a:schemeClr val="lt2"/>
+          </a:solidFill>
+          <a:ln>
+            <a:noFill/>
+          </a:ln>
+        </p:spPr>
+        <p:style>
+          <a:lnRef idx="0"/>
+          <a:fillRef idx="0"/>
+          <a:effectRef idx="0"/>
+          <a:fontRef idx="minor"/>
+        </p:style>
+      </p:sp>
+      <p:grpSp>
+        <p:nvGrpSpPr>
+          <p:cNvPr id="129" name="Group 2"/>
+          <p:cNvGrpSpPr/>
+          <p:nvPr/>
+        </p:nvGrpSpPr>
+        <p:grpSpPr>
+          <a:xfrm>
+            <a:off x="830520" y="1191600"/>
+            <a:ext cx="745200" cy="45360"/>
+            <a:chOff x="830520" y="1191600"/>
+            <a:chExt cx="745200" cy="45360"/>
+          </a:xfrm>
+        </p:grpSpPr>
+        <p:sp>
+          <p:nvSpPr>
+            <p:cNvPr id="130" name="CustomShape 3"/>
+            <p:cNvSpPr/>
+            <p:nvPr/>
+          </p:nvSpPr>
+          <p:spPr>
+            <a:xfrm rot="16200000">
+              <a:off x="1366560" y="1027800"/>
+              <a:ext cx="45360" cy="372600"/>
+            </a:xfrm>
+            <a:prstGeom prst="rect">
+              <a:avLst/>
+            </a:prstGeom>
+            <a:solidFill>
+              <a:schemeClr val="accent3"/>
+            </a:solidFill>
+            <a:ln>
+              <a:noFill/>
+            </a:ln>
+          </p:spPr>
+          <p:style>
+            <a:lnRef idx="0"/>
+            <a:fillRef idx="0"/>
+            <a:effectRef idx="0"/>
+            <a:fontRef idx="minor"/>
+          </p:style>
+        </p:sp>
+        <p:sp>
+          <p:nvSpPr>
+            <p:cNvPr id="131" name="CustomShape 4"/>
+            <p:cNvSpPr/>
+            <p:nvPr/>
+          </p:nvSpPr>
+          <p:spPr>
+            <a:xfrm rot="16200000">
+              <a:off x="995400" y="1026360"/>
+              <a:ext cx="45360" cy="375480"/>
+            </a:xfrm>
+            <a:prstGeom prst="rect">
+              <a:avLst/>
+            </a:prstGeom>
+            <a:solidFill>
+              <a:schemeClr val="dk1"/>
+            </a:solidFill>
+            <a:ln>
+              <a:noFill/>
+            </a:ln>
+          </p:spPr>
+          <p:style>
+            <a:lnRef idx="0"/>
+            <a:fillRef idx="0"/>
+            <a:effectRef idx="0"/>
+            <a:fontRef idx="minor"/>
+          </p:style>
+        </p:sp>
+      </p:grpSp>
+      <p:sp>
+        <p:nvSpPr>
+          <p:cNvPr id="132" name="PlaceHolder 5"/>
+          <p:cNvSpPr>
+            <a:spLocks noGrp="1"/>
+          </p:cNvSpPr>
+          <p:nvPr>
+            <p:ph type="title"/>
+          </p:nvPr>
+        </p:nvSpPr>
+        <p:spPr>
+          <a:xfrm>
+            <a:off x="729360" y="1318680"/>
+            <a:ext cx="7688520" cy="534960"/>
+          </a:xfrm>
+          <a:prstGeom prst="rect">
+            <a:avLst/>
+          </a:prstGeom>
+        </p:spPr>
+        <p:txBody>
+          <a:bodyPr tIns="91440" bIns="91440">
+            <a:noAutofit/>
+          </a:bodyPr>
+          <a:p>
+            <a:r>
+              <a:rPr b="0" lang="en-US" sz="2600" spc="-1" strike="noStrike">
+                <a:solidFill>
+                  <a:srgbClr val="000000"/>
+                </a:solidFill>
+                <a:latin typeface="Arial"/>
+              </a:rPr>
+              <a:t>Click to edit the title text format</a:t>
+            </a:r>
+            <a:endParaRPr b="0" lang="en-US" sz="2600" spc="-1" strike="noStrike">
+              <a:solidFill>
+                <a:srgbClr val="000000"/>
+              </a:solidFill>
+              <a:latin typeface="Arial"/>
+            </a:endParaRPr>
+          </a:p>
+        </p:txBody>
+      </p:sp>
+      <p:sp>
+        <p:nvSpPr>
+          <p:cNvPr id="133" name="PlaceHolder 6"/>
+          <p:cNvSpPr>
+            <a:spLocks noGrp="1"/>
+          </p:cNvSpPr>
+          <p:nvPr>
+            <p:ph type="body"/>
+          </p:nvPr>
+        </p:nvSpPr>
+        <p:spPr>
+          <a:xfrm>
+            <a:off x="729360" y="2079000"/>
+            <a:ext cx="7688520" cy="2260800"/>
+          </a:xfrm>
+          <a:prstGeom prst="rect">
+            <a:avLst/>
+          </a:prstGeom>
+        </p:spPr>
+        <p:txBody>
+          <a:bodyPr tIns="91440" bIns="91440">
+            <a:noAutofit/>
+          </a:bodyPr>
+          <a:p>
+            <a:pPr marL="432000" indent="-324000">
+              <a:spcBef>
+                <a:spcPts val="1417"/>
+              </a:spcBef>
+              <a:buClr>
+                <a:srgbClr val="000000"/>
+              </a:buClr>
+              <a:buSzPct val="45000"/>
+              <a:buFont typeface="Wingdings" charset="2"/>
+              <a:buChar char=""/>
+            </a:pPr>
+            <a:r>
+              <a:rPr b="0" lang="en-US" sz="1300" spc="-1" strike="noStrike">
+                <a:solidFill>
+                  <a:srgbClr val="000000"/>
+                </a:solidFill>
+                <a:latin typeface="Arial"/>
+              </a:rPr>
+              <a:t>Click to edit the outline text format</a:t>
+            </a:r>
+            <a:endParaRPr b="0" lang="en-US" sz="1300" spc="-1" strike="noStrike">
+              <a:solidFill>
+                <a:srgbClr val="000000"/>
+              </a:solidFill>
+              <a:latin typeface="Arial"/>
+            </a:endParaRPr>
+          </a:p>
+          <a:p>
+            <a:pPr lvl="1" marL="864000" indent="-324000">
+              <a:spcBef>
+                <a:spcPts val="1134"/>
+              </a:spcBef>
+              <a:buClr>
+                <a:srgbClr val="000000"/>
+              </a:buClr>
+              <a:buSzPct val="75000"/>
+              <a:buFont typeface="Symbol" charset="2"/>
+              <a:buChar char=""/>
+            </a:pPr>
+            <a:r>
+              <a:rPr b="0" lang="en-US" sz="1300" spc="-1" strike="noStrike">
+                <a:solidFill>
+                  <a:srgbClr val="000000"/>
+                </a:solidFill>
+                <a:latin typeface="Arial"/>
+              </a:rPr>
+              <a:t>Second Outline Level</a:t>
+            </a:r>
+            <a:endParaRPr b="0" lang="en-US" sz="1300" spc="-1" strike="noStrike">
+              <a:solidFill>
+                <a:srgbClr val="000000"/>
+              </a:solidFill>
+              <a:latin typeface="Arial"/>
+            </a:endParaRPr>
+          </a:p>
+          <a:p>
+            <a:pPr lvl="2" marL="1296000" indent="-288000">
+              <a:spcBef>
+                <a:spcPts val="850"/>
+              </a:spcBef>
+              <a:buClr>
+                <a:srgbClr val="000000"/>
+              </a:buClr>
+              <a:buSzPct val="45000"/>
+              <a:buFont typeface="Wingdings" charset="2"/>
+              <a:buChar char=""/>
+            </a:pPr>
+            <a:r>
+              <a:rPr b="0" lang="en-US" sz="1300" spc="-1" strike="noStrike">
+                <a:solidFill>
+                  <a:srgbClr val="000000"/>
+                </a:solidFill>
+                <a:latin typeface="Arial"/>
+              </a:rPr>
+              <a:t>Third Outline Level</a:t>
+            </a:r>
+            <a:endParaRPr b="0" lang="en-US" sz="1300" spc="-1" strike="noStrike">
+              <a:solidFill>
+                <a:srgbClr val="000000"/>
+              </a:solidFill>
+              <a:latin typeface="Arial"/>
+            </a:endParaRPr>
+          </a:p>
+          <a:p>
+            <a:pPr lvl="3" marL="1728000" indent="-216000">
+              <a:spcBef>
+                <a:spcPts val="567"/>
+              </a:spcBef>
+              <a:buClr>
+                <a:srgbClr val="000000"/>
+              </a:buClr>
+              <a:buSzPct val="75000"/>
+              <a:buFont typeface="Symbol" charset="2"/>
+              <a:buChar char=""/>
+            </a:pPr>
+            <a:r>
+              <a:rPr b="0" lang="en-US" sz="1300" spc="-1" strike="noStrike">
+                <a:solidFill>
+                  <a:srgbClr val="000000"/>
+                </a:solidFill>
+                <a:latin typeface="Arial"/>
+              </a:rPr>
+              <a:t>Fourth Outline Level</a:t>
+            </a:r>
+            <a:endParaRPr b="0" lang="en-US" sz="1300" spc="-1" strike="noStrike">
+              <a:solidFill>
+                <a:srgbClr val="000000"/>
+              </a:solidFill>
+              <a:latin typeface="Arial"/>
+            </a:endParaRPr>
+          </a:p>
+          <a:p>
+            <a:pPr lvl="4" marL="2160000" indent="-216000">
+              <a:spcBef>
+                <a:spcPts val="283"/>
+              </a:spcBef>
+              <a:buClr>
+                <a:srgbClr val="000000"/>
+              </a:buClr>
+              <a:buSzPct val="45000"/>
+              <a:buFont typeface="Wingdings" charset="2"/>
+              <a:buChar char=""/>
+            </a:pPr>
+            <a:r>
+              <a:rPr b="0" lang="en-US" sz="1300" spc="-1" strike="noStrike">
+                <a:solidFill>
+                  <a:srgbClr val="000000"/>
+                </a:solidFill>
+                <a:latin typeface="Arial"/>
+              </a:rPr>
+              <a:t>Fifth Outline Level</a:t>
+            </a:r>
+            <a:endParaRPr b="0" lang="en-US" sz="1300" spc="-1" strike="noStrike">
+              <a:solidFill>
+                <a:srgbClr val="000000"/>
+              </a:solidFill>
+              <a:latin typeface="Arial"/>
+            </a:endParaRPr>
+          </a:p>
+          <a:p>
+            <a:pPr lvl="5" marL="2592000" indent="-216000">
+              <a:spcBef>
+                <a:spcPts val="283"/>
+              </a:spcBef>
+              <a:buClr>
+                <a:srgbClr val="000000"/>
+              </a:buClr>
+              <a:buSzPct val="45000"/>
+              <a:buFont typeface="Wingdings" charset="2"/>
+              <a:buChar char=""/>
+            </a:pPr>
+            <a:r>
+              <a:rPr b="0" lang="en-US" sz="1300" spc="-1" strike="noStrike">
+                <a:solidFill>
+                  <a:srgbClr val="000000"/>
+                </a:solidFill>
+                <a:latin typeface="Arial"/>
+              </a:rPr>
+              <a:t>Sixth Outline Level</a:t>
+            </a:r>
+            <a:endParaRPr b="0" lang="en-US" sz="1300" spc="-1" strike="noStrike">
+              <a:solidFill>
+                <a:srgbClr val="000000"/>
+              </a:solidFill>
+              <a:latin typeface="Arial"/>
+            </a:endParaRPr>
+          </a:p>
+          <a:p>
+            <a:pPr lvl="6" marL="3024000" indent="-216000">
+              <a:spcBef>
+                <a:spcPts val="283"/>
+              </a:spcBef>
+              <a:buClr>
+                <a:srgbClr val="000000"/>
+              </a:buClr>
+              <a:buSzPct val="45000"/>
+              <a:buFont typeface="Wingdings" charset="2"/>
+              <a:buChar char=""/>
+            </a:pPr>
+            <a:r>
+              <a:rPr b="0" lang="en-US" sz="1300" spc="-1" strike="noStrike">
+                <a:solidFill>
+                  <a:srgbClr val="000000"/>
+                </a:solidFill>
+                <a:latin typeface="Arial"/>
+              </a:rPr>
+              <a:t>Seventh Outline Level</a:t>
+            </a:r>
+            <a:endParaRPr b="0" lang="en-US" sz="1300" spc="-1" strike="noStrike">
+              <a:solidFill>
+                <a:srgbClr val="000000"/>
+              </a:solidFill>
+              <a:latin typeface="Arial"/>
+            </a:endParaRPr>
+          </a:p>
+        </p:txBody>
+      </p:sp>
+      <p:sp>
+        <p:nvSpPr>
+          <p:cNvPr id="134" name="PlaceHolder 7"/>
+          <p:cNvSpPr>
+            <a:spLocks noGrp="1"/>
+          </p:cNvSpPr>
+          <p:nvPr>
+            <p:ph type="sldNum"/>
+          </p:nvPr>
+        </p:nvSpPr>
+        <p:spPr>
+          <a:xfrm>
+            <a:off x="8536320" y="4749840"/>
+            <a:ext cx="548280" cy="393120"/>
+          </a:xfrm>
+          <a:prstGeom prst="rect">
+            <a:avLst/>
+          </a:prstGeom>
+        </p:spPr>
+        <p:txBody>
+          <a:bodyPr tIns="91440" bIns="91440" anchor="ctr">
+            <a:noAutofit/>
+          </a:bodyPr>
+          <a:p>
+            <a:pPr algn="r">
+              <a:lnSpc>
+                <a:spcPct val="100000"/>
+              </a:lnSpc>
+              <a:tabLst>
+                <a:tab algn="l" pos="0"/>
+              </a:tabLst>
+            </a:pPr>
+            <a:fld id="{2DB220A4-9FF9-433A-A57C-2BACC61B2CE6}" type="slidenum">
+              <a:rPr b="0" lang="id" sz="1000" spc="-1" strike="noStrike">
+                <a:solidFill>
+                  <a:srgbClr val="595959"/>
+                </a:solidFill>
+                <a:latin typeface="Lato"/>
+                <a:ea typeface="Lato"/>
+              </a:rPr>
+              <a:t>&lt;number&gt;</a:t>
+            </a:fld>
+            <a:endParaRPr b="0" lang="en-US" sz="1000" spc="-1" strike="noStrike">
+              <a:latin typeface="Times New Roman"/>
+            </a:endParaRPr>
+          </a:p>
+        </p:txBody>
+      </p:sp>
+    </p:spTree>
+  </p:cSld>
+  <p:clrMap bg1="lt1" bg2="lt2" tx1="dk1" tx2="dk2" accent1="accent1" accent2="accent2" accent3="accent3" accent4="accent4" accent5="accent5" accent6="accent6" hlink="hlink" folHlink="folHlink"/>
+  <p:sldLayoutIdLst>
+    <p:sldLayoutId id="2147483688" r:id="rId2"/>
+    <p:sldLayoutId id="2147483689" r:id="rId3"/>
+    <p:sldLayoutId id="2147483690" r:id="rId4"/>
+    <p:sldLayoutId id="2147483691" r:id="rId5"/>
+    <p:sldLayoutId id="2147483692" r:id="rId6"/>
+    <p:sldLayoutId id="2147483693" r:id="rId7"/>
+    <p:sldLayoutId id="2147483694" r:id="rId8"/>
+    <p:sldLayoutId id="2147483695" r:id="rId9"/>
+    <p:sldLayoutId id="2147483696" r:id="rId10"/>
+    <p:sldLayoutId id="2147483697" r:id="rId11"/>
+    <p:sldLayoutId id="2147483698" r:id="rId12"/>
+    <p:sldLayoutId id="2147483699" r:id="rId13"/>
   </p:sldLayoutIdLst>
 </p:sldMaster>
 </file>
@@ -5713,7 +7623,7 @@
       </p:grpSpPr>
       <p:sp>
         <p:nvSpPr>
-          <p:cNvPr id="128" name="TextShape 1"/>
+          <p:cNvPr id="171" name="TextShape 1"/>
           <p:cNvSpPr txBox="1"/>
           <p:nvPr/>
         </p:nvSpPr>
@@ -5764,7 +7674,7 @@
       </p:sp>
       <p:sp>
         <p:nvSpPr>
-          <p:cNvPr id="129" name="TextShape 2"/>
+          <p:cNvPr id="172" name="TextShape 2"/>
           <p:cNvSpPr txBox="1"/>
           <p:nvPr/>
         </p:nvSpPr>
@@ -5805,6 +7715,267 @@
               <a:t>Eko Kurniawan Khannedy</a:t>
             </a:r>
             <a:endParaRPr b="0" lang="en-US" sz="1600" spc="-1" strike="noStrike">
+              <a:latin typeface="Arial"/>
+            </a:endParaRPr>
+          </a:p>
+        </p:txBody>
+      </p:sp>
+    </p:spTree>
+  </p:cSld>
+  <mc:AlternateContent>
+    <mc:Choice Requires="p14">
+      <p:transition spd="slow" p14:dur="2000"/>
+    </mc:Choice>
+    <mc:Fallback>
+      <p:transition spd="slow"/>
+    </mc:Fallback>
+  </mc:AlternateContent>
+</p:sld>
+</file>
+
+<file path=ppt/slides/slide10.xml><?xml version="1.0" encoding="utf-8"?>
+<p:sld xmlns:a="http://schemas.openxmlformats.org/drawingml/2006/main" xmlns:p="http://schemas.openxmlformats.org/presentationml/2006/main" xmlns:r="http://schemas.openxmlformats.org/officeDocument/2006/relationships" xmlns:p14="http://schemas.microsoft.com/office/powerpoint/2010/main" xmlns:p15="http://schemas.microsoft.com/office/powerpoint/2012/main" xmlns:mc="http://schemas.openxmlformats.org/markup-compatibility/2006">
+  <p:cSld>
+    <p:spTree>
+      <p:nvGrpSpPr>
+        <p:cNvPr id="1" name=""/>
+        <p:cNvGrpSpPr/>
+        <p:nvPr/>
+      </p:nvGrpSpPr>
+      <p:grpSpPr>
+        <a:xfrm>
+          <a:off x="0" y="0"/>
+          <a:ext cx="0" cy="0"/>
+          <a:chOff x="0" y="0"/>
+          <a:chExt cx="0" cy="0"/>
+        </a:xfrm>
+      </p:grpSpPr>
+      <p:sp>
+        <p:nvSpPr>
+          <p:cNvPr id="186" name="TextShape 1"/>
+          <p:cNvSpPr txBox="1"/>
+          <p:nvPr/>
+        </p:nvSpPr>
+        <p:spPr>
+          <a:xfrm>
+            <a:off x="729360" y="1318680"/>
+            <a:ext cx="7688520" cy="534960"/>
+          </a:xfrm>
+          <a:prstGeom prst="rect">
+            <a:avLst/>
+          </a:prstGeom>
+          <a:noFill/>
+          <a:ln>
+            <a:noFill/>
+          </a:ln>
+        </p:spPr>
+        <p:txBody>
+          <a:bodyPr tIns="91440" bIns="91440">
+            <a:noAutofit/>
+          </a:bodyPr>
+          <a:p>
+            <a:pPr>
+              <a:lnSpc>
+                <a:spcPct val="100000"/>
+              </a:lnSpc>
+              <a:tabLst>
+                <a:tab algn="l" pos="0"/>
+              </a:tabLst>
+            </a:pPr>
+            <a:r>
+              <a:rPr b="1" lang="id" sz="2600" spc="-1" strike="noStrike">
+                <a:solidFill>
+                  <a:srgbClr val="1a1a1a"/>
+                </a:solidFill>
+                <a:latin typeface="Raleway"/>
+                <a:ea typeface="Raleway"/>
+              </a:rPr>
+              <a:t>Clone Repository</a:t>
+            </a:r>
+            <a:endParaRPr b="0" lang="en-US" sz="2600" spc="-1" strike="noStrike">
+              <a:solidFill>
+                <a:srgbClr val="000000"/>
+              </a:solidFill>
+              <a:latin typeface="Arial"/>
+            </a:endParaRPr>
+          </a:p>
+        </p:txBody>
+      </p:sp>
+      <p:sp>
+        <p:nvSpPr>
+          <p:cNvPr id="187" name="TextShape 2"/>
+          <p:cNvSpPr txBox="1"/>
+          <p:nvPr/>
+        </p:nvSpPr>
+        <p:spPr>
+          <a:xfrm>
+            <a:off x="729360" y="2079000"/>
+            <a:ext cx="7688520" cy="2260800"/>
+          </a:xfrm>
+          <a:prstGeom prst="rect">
+            <a:avLst/>
+          </a:prstGeom>
+          <a:noFill/>
+          <a:ln>
+            <a:noFill/>
+          </a:ln>
+        </p:spPr>
+        <p:txBody>
+          <a:bodyPr tIns="91440" bIns="91440">
+            <a:noAutofit/>
+          </a:bodyPr>
+          <a:p>
+            <a:pPr marL="457200" indent="-310680">
+              <a:lnSpc>
+                <a:spcPct val="115000"/>
+              </a:lnSpc>
+              <a:buClr>
+                <a:srgbClr val="595959"/>
+              </a:buClr>
+              <a:buFont typeface="Lato"/>
+              <a:buChar char="●"/>
+            </a:pPr>
+            <a:r>
+              <a:rPr b="0" lang="id" sz="1200" spc="-1" strike="noStrike">
+                <a:solidFill>
+                  <a:srgbClr val="595959"/>
+                </a:solidFill>
+                <a:latin typeface="Lato"/>
+                <a:ea typeface="Lato"/>
+              </a:rPr>
+              <a:t>Untuk melakukan Colen repository dari GitServer ke Gitlocal</a:t>
+            </a:r>
+            <a:endParaRPr b="0" lang="en-US" sz="1200" spc="-1" strike="noStrike">
+              <a:solidFill>
+                <a:srgbClr val="000000"/>
+              </a:solidFill>
+              <a:latin typeface="Arial"/>
+            </a:endParaRPr>
+          </a:p>
+          <a:p>
+            <a:pPr lvl="1" marL="864000" indent="-324000">
+              <a:spcBef>
+                <a:spcPts val="1134"/>
+              </a:spcBef>
+              <a:buClr>
+                <a:srgbClr val="000000"/>
+              </a:buClr>
+              <a:buSzPct val="75000"/>
+              <a:buFont typeface="Symbol" charset="2"/>
+              <a:buChar char=""/>
+            </a:pPr>
+            <a:r>
+              <a:rPr b="1" lang="id" sz="1200" spc="-1" strike="noStrike">
+                <a:solidFill>
+                  <a:srgbClr val="595959"/>
+                </a:solidFill>
+                <a:latin typeface="Lato"/>
+                <a:ea typeface="Lato"/>
+              </a:rPr>
+              <a:t>git clone [url_repo_git_server]</a:t>
+            </a:r>
+            <a:endParaRPr b="0" lang="en-US" sz="1200" spc="-1" strike="noStrike">
+              <a:solidFill>
+                <a:srgbClr val="000000"/>
+              </a:solidFill>
+              <a:latin typeface="Arial"/>
+            </a:endParaRPr>
+          </a:p>
+          <a:p>
+            <a:pPr lvl="1" marL="864000" indent="-324000">
+              <a:lnSpc>
+                <a:spcPct val="100000"/>
+              </a:lnSpc>
+              <a:spcBef>
+                <a:spcPts val="1134"/>
+              </a:spcBef>
+              <a:buClr>
+                <a:srgbClr val="000000"/>
+              </a:buClr>
+              <a:buSzPct val="75000"/>
+              <a:buFont typeface="Symbol" charset="2"/>
+              <a:buChar char=""/>
+            </a:pPr>
+            <a:r>
+              <a:rPr b="1" lang="id" sz="1200" spc="-1" strike="noStrike">
+                <a:solidFill>
+                  <a:srgbClr val="595959"/>
+                </a:solidFill>
+                <a:latin typeface="Lato"/>
+                <a:ea typeface="Lato"/>
+              </a:rPr>
+              <a:t>Ex: git clone </a:t>
+            </a:r>
+            <a:r>
+              <a:rPr b="1" lang="id" sz="1200" spc="-1" strike="noStrike">
+                <a:solidFill>
+                  <a:srgbClr val="595959"/>
+                </a:solidFill>
+                <a:latin typeface="Lato"/>
+                <a:ea typeface="Lato"/>
+              </a:rPr>
+              <a:t>git@gitlab.com:meaku00000/repo-git.git</a:t>
+            </a:r>
+            <a:endParaRPr b="0" lang="en-US" sz="1200" spc="-1" strike="noStrike">
+              <a:solidFill>
+                <a:srgbClr val="000000"/>
+              </a:solidFill>
+              <a:latin typeface="Arial"/>
+            </a:endParaRPr>
+          </a:p>
+          <a:p>
+            <a:pPr marL="457200" indent="-310680">
+              <a:lnSpc>
+                <a:spcPct val="115000"/>
+              </a:lnSpc>
+              <a:buClr>
+                <a:srgbClr val="595959"/>
+              </a:buClr>
+              <a:buFont typeface="Lato"/>
+              <a:buChar char="●"/>
+            </a:pPr>
+            <a:r>
+              <a:rPr b="0" lang="id" sz="1200" spc="-1" strike="noStrike">
+                <a:solidFill>
+                  <a:srgbClr val="595959"/>
+                </a:solidFill>
+                <a:latin typeface="Lato"/>
+                <a:ea typeface="Lato"/>
+              </a:rPr>
+              <a:t>Bisa menggunakan link SSH atau HTTP</a:t>
+            </a:r>
+            <a:r>
+              <a:rPr b="1" lang="id" sz="1200" spc="-1" strike="noStrike">
+                <a:solidFill>
+                  <a:srgbClr val="595959"/>
+                </a:solidFill>
+                <a:latin typeface="Lato"/>
+                <a:ea typeface="Lato"/>
+              </a:rPr>
+              <a:t> </a:t>
+            </a:r>
+            <a:endParaRPr b="0" lang="en-US" sz="1200" spc="-1" strike="noStrike">
+              <a:solidFill>
+                <a:srgbClr val="000000"/>
+              </a:solidFill>
+              <a:latin typeface="Arial"/>
+            </a:endParaRPr>
+          </a:p>
+          <a:p>
+            <a:pPr marL="457200" indent="-310680">
+              <a:lnSpc>
+                <a:spcPct val="115000"/>
+              </a:lnSpc>
+              <a:buClr>
+                <a:srgbClr val="595959"/>
+              </a:buClr>
+              <a:buFont typeface="Lato"/>
+              <a:buChar char="●"/>
+            </a:pPr>
+            <a:endParaRPr b="0" lang="en-US" sz="1200" spc="-1" strike="noStrike">
+              <a:solidFill>
+                <a:srgbClr val="000000"/>
+              </a:solidFill>
               <a:latin typeface="Arial"/>
             </a:endParaRPr>
           </a:p>
@@ -5842,7 +8013,7 @@
       </p:grpSpPr>
       <p:sp>
         <p:nvSpPr>
-          <p:cNvPr id="130" name="TextShape 1"/>
+          <p:cNvPr id="173" name="TextShape 1"/>
           <p:cNvSpPr txBox="1"/>
           <p:nvPr/>
         </p:nvSpPr>
@@ -5923,7 +8094,7 @@
       </p:grpSpPr>
       <p:sp>
         <p:nvSpPr>
-          <p:cNvPr id="131" name="TextShape 1"/>
+          <p:cNvPr id="174" name="TextShape 1"/>
           <p:cNvSpPr txBox="1"/>
           <p:nvPr/>
         </p:nvSpPr>
@@ -5961,7 +8132,7 @@
                 <a:latin typeface="Raleway"/>
                 <a:ea typeface="Raleway"/>
               </a:rPr>
-              <a:t>Git Remote</a:t>
+              <a:t>Git SSH</a:t>
             </a:r>
             <a:endParaRPr b="0" lang="en-US" sz="2600" spc="-1" strike="noStrike">
               <a:solidFill>
@@ -5974,7 +8145,7 @@
       </p:sp>
       <p:sp>
         <p:nvSpPr>
-          <p:cNvPr id="132" name="TextShape 2"/>
+          <p:cNvPr id="175" name="TextShape 2"/>
           <p:cNvSpPr txBox="1"/>
           <p:nvPr/>
         </p:nvSpPr>
@@ -6007,16 +8178,16 @@
               <a:buChar char="●"/>
             </a:pPr>
             <a:r>
-              <a:rPr b="0" lang="id" sz="1300" spc="-1" strike="noStrike">
+              <a:rPr b="0" lang="id" sz="1200" spc="-1" strike="noStrike">
                 <a:solidFill>
                   <a:srgbClr val="595959"/>
                 </a:solidFill>
                 <a:latin typeface="Lato"/>
                 <a:ea typeface="Lato"/>
               </a:rPr>
-              <a:t>Sebelumnya kita sudah belajar semua fitur yang terdapat di Git</a:t>
+              <a:t>Keuntungan menggunakan SSH kita tidak akan diminta lagi memasukan id dan pass</a:t>
             </a:r>
-            <a:endParaRPr b="0" lang="en-US" sz="1300" spc="-1" strike="noStrike">
+            <a:endParaRPr b="0" lang="en-US" sz="1200" spc="-1" strike="noStrike">
               <a:solidFill>
                 <a:srgbClr val="000000"/>
               </a:solidFill>
@@ -6035,16 +8206,16 @@
               <a:buChar char="●"/>
             </a:pPr>
             <a:r>
-              <a:rPr b="0" lang="id" sz="1300" spc="-1" strike="noStrike">
+              <a:rPr b="0" lang="id" sz="1200" spc="-1" strike="noStrike">
                 <a:solidFill>
                   <a:srgbClr val="595959"/>
                 </a:solidFill>
                 <a:latin typeface="Lato"/>
                 <a:ea typeface="Lato"/>
               </a:rPr>
-              <a:t>Namun semua fitur yang kita bahas, masih kita lakukan di local komputer kita masing-masing</a:t>
+              <a:t>GitHub, GitLab, GitBucket dll. Itu merupakan SSH server, sedangkan SSH clientnya itu leptop kita</a:t>
             </a:r>
-            <a:endParaRPr b="0" lang="en-US" sz="1300" spc="-1" strike="noStrike">
+            <a:endParaRPr b="0" lang="en-US" sz="1200" spc="-1" strike="noStrike">
               <a:solidFill>
                 <a:srgbClr val="000000"/>
               </a:solidFill>
@@ -6063,16 +8234,45 @@
               <a:buChar char="●"/>
             </a:pPr>
             <a:r>
-              <a:rPr b="0" lang="id" sz="1300" spc="-1" strike="noStrike">
+              <a:rPr b="0" lang="id" sz="1200" spc="-1" strike="noStrike">
                 <a:solidFill>
                   <a:srgbClr val="595959"/>
                 </a:solidFill>
                 <a:latin typeface="Lato"/>
                 <a:ea typeface="Lato"/>
               </a:rPr>
-              <a:t>Saat nanti bekerja dengan tim, atau berkolaborasi, kita tidak hanya akan menyimpan git repository pada satu komputer saja</a:t>
+              <a:t>Untuk membuat SSH Key perintahnya di terminalnya:</a:t>
             </a:r>
-            <a:endParaRPr b="0" lang="en-US" sz="1300" spc="-1" strike="noStrike">
+            <a:endParaRPr b="0" lang="en-US" sz="1200" spc="-1" strike="noStrike">
+              <a:solidFill>
+                <a:srgbClr val="000000"/>
+              </a:solidFill>
+              <a:latin typeface="Arial"/>
+            </a:endParaRPr>
+          </a:p>
+          <a:p>
+            <a:pPr lvl="1" marL="864000" indent="-324000">
+              <a:spcBef>
+                <a:spcPts val="1134"/>
+              </a:spcBef>
+              <a:buClr>
+                <a:srgbClr val="000000"/>
+              </a:buClr>
+              <a:buSzPct val="75000"/>
+              <a:buFont typeface="Symbol" charset="2"/>
+              <a:buChar char=""/>
+            </a:pPr>
+            <a:r>
+              <a:rPr b="1" lang="id" sz="1200" spc="-1" strike="noStrike">
+                <a:solidFill>
+                  <a:srgbClr val="595959"/>
+                </a:solidFill>
+                <a:latin typeface="Lato"/>
+                <a:ea typeface="Lato"/>
+              </a:rPr>
+              <a:t>ssh-keygen</a:t>
+            </a:r>
+            <a:endParaRPr b="0" lang="en-US" sz="1200" spc="-1" strike="noStrike">
               <a:solidFill>
                 <a:srgbClr val="000000"/>
               </a:solidFill>
@@ -6091,16 +8291,16 @@
               <a:buChar char="●"/>
             </a:pPr>
             <a:r>
-              <a:rPr b="0" lang="id" sz="1300" spc="-1" strike="noStrike">
+              <a:rPr b="0" lang="id" sz="1200" spc="-1" strike="noStrike">
                 <a:solidFill>
                   <a:srgbClr val="595959"/>
                 </a:solidFill>
                 <a:latin typeface="Lato"/>
                 <a:ea typeface="Lato"/>
               </a:rPr>
-              <a:t>Tiap anggota tim, kemungkinan akan meng-copy git repository yang kita buat, dan juga melakukan kontribusi ke git repository nya</a:t>
+              <a:t>id_rsa adalah private key, sedangkan id_rsa.pub adalah public key</a:t>
             </a:r>
-            <a:endParaRPr b="0" lang="en-US" sz="1300" spc="-1" strike="noStrike">
+            <a:endParaRPr b="0" lang="en-US" sz="1200" spc="-1" strike="noStrike">
               <a:solidFill>
                 <a:srgbClr val="000000"/>
               </a:solidFill>
@@ -6119,16 +8319,16 @@
               <a:buChar char="●"/>
             </a:pPr>
             <a:r>
-              <a:rPr b="0" lang="id" sz="1300" spc="-1" strike="noStrike">
+              <a:rPr b="0" lang="id" sz="1200" spc="-1" strike="noStrike">
                 <a:solidFill>
                   <a:srgbClr val="595959"/>
                 </a:solidFill>
                 <a:latin typeface="Lato"/>
                 <a:ea typeface="Lato"/>
               </a:rPr>
-              <a:t>Git mendukung centralized server, dimana kita bisa menyimpan perubahan git repository di komputer ke Git server</a:t>
+              <a:t>Untuk melihat folder dari SSH-nya biasanya terletak pada /user/home/.shh/</a:t>
             </a:r>
-            <a:endParaRPr b="0" lang="en-US" sz="1300" spc="-1" strike="noStrike">
+            <a:endParaRPr b="0" lang="en-US" sz="1200" spc="-1" strike="noStrike">
               <a:solidFill>
                 <a:srgbClr val="000000"/>
               </a:solidFill>
@@ -6147,16 +8347,16 @@
               <a:buChar char="●"/>
             </a:pPr>
             <a:r>
-              <a:rPr b="0" lang="id" sz="1300" spc="-1" strike="noStrike">
+              <a:rPr b="0" lang="id" sz="1200" spc="-1" strike="noStrike">
                 <a:solidFill>
                   <a:srgbClr val="595959"/>
                 </a:solidFill>
                 <a:latin typeface="Lato"/>
                 <a:ea typeface="Lato"/>
               </a:rPr>
-              <a:t>Karena Git merupakan distributed version control, walaupun kita gunakan Git Server, tapi kita tidak wajib terkoneksi ketika ingin mengelola git repository</a:t>
+              <a:t>Setelah SSH-Key nya terbuat, kita harus meregistrasikan SSH public key ke GitServer</a:t>
             </a:r>
-            <a:endParaRPr b="0" lang="en-US" sz="1300" spc="-1" strike="noStrike">
+            <a:endParaRPr b="0" lang="en-US" sz="1200" spc="-1" strike="noStrike">
               <a:solidFill>
                 <a:srgbClr val="000000"/>
               </a:solidFill>
@@ -6175,16 +8375,1414 @@
               <a:buChar char="●"/>
             </a:pPr>
             <a:r>
-              <a:rPr b="0" lang="id" sz="1300" spc="-1" strike="noStrike">
+              <a:rPr b="0" lang="id" sz="1200" spc="-1" strike="noStrike">
                 <a:solidFill>
                   <a:srgbClr val="595959"/>
                 </a:solidFill>
                 <a:latin typeface="Lato"/>
                 <a:ea typeface="Lato"/>
               </a:rPr>
-              <a:t>Hanya ketika kita ingin mengirim perubahan atau mengambil perubahan, baru kita butuh terkoneksi ke Git Server</a:t>
+              <a:t>Untuk mengecek kita sudah terhubuh ke GitServer printah terminalnya:</a:t>
             </a:r>
-            <a:endParaRPr b="0" lang="en-US" sz="1300" spc="-1" strike="noStrike">
+            <a:endParaRPr b="0" lang="en-US" sz="1200" spc="-1" strike="noStrike">
+              <a:solidFill>
+                <a:srgbClr val="000000"/>
+              </a:solidFill>
+              <a:latin typeface="Arial"/>
+            </a:endParaRPr>
+          </a:p>
+          <a:p>
+            <a:pPr lvl="1" marL="864000" indent="-324000">
+              <a:spcBef>
+                <a:spcPts val="1134"/>
+              </a:spcBef>
+              <a:buClr>
+                <a:srgbClr val="000000"/>
+              </a:buClr>
+              <a:buSzPct val="75000"/>
+              <a:buFont typeface="Symbol" charset="2"/>
+              <a:buChar char=""/>
+            </a:pPr>
+            <a:r>
+              <a:rPr b="1" lang="id" sz="1200" spc="-1" strike="noStrike">
+                <a:solidFill>
+                  <a:srgbClr val="595959"/>
+                </a:solidFill>
+                <a:latin typeface="Lato"/>
+                <a:ea typeface="Lato"/>
+              </a:rPr>
+              <a:t>ssh -T git@github.com</a:t>
+            </a:r>
+            <a:endParaRPr b="0" lang="en-US" sz="1200" spc="-1" strike="noStrike">
+              <a:solidFill>
+                <a:srgbClr val="000000"/>
+              </a:solidFill>
+              <a:latin typeface="Arial"/>
+            </a:endParaRPr>
+          </a:p>
+          <a:p>
+            <a:pPr marL="457200" indent="-310680">
+              <a:lnSpc>
+                <a:spcPct val="115000"/>
+              </a:lnSpc>
+              <a:buClr>
+                <a:srgbClr val="595959"/>
+              </a:buClr>
+              <a:buFont typeface="Lato"/>
+              <a:buChar char="●"/>
+            </a:pPr>
+            <a:endParaRPr b="0" lang="en-US" sz="1200" spc="-1" strike="noStrike">
+              <a:solidFill>
+                <a:srgbClr val="000000"/>
+              </a:solidFill>
+              <a:latin typeface="Arial"/>
+            </a:endParaRPr>
+          </a:p>
+          <a:p>
+            <a:pPr marL="457200" indent="-310680">
+              <a:lnSpc>
+                <a:spcPct val="115000"/>
+              </a:lnSpc>
+              <a:buClr>
+                <a:srgbClr val="595959"/>
+              </a:buClr>
+              <a:buFont typeface="Lato"/>
+              <a:buChar char="●"/>
+            </a:pPr>
+            <a:endParaRPr b="0" lang="en-US" sz="1200" spc="-1" strike="noStrike">
+              <a:solidFill>
+                <a:srgbClr val="000000"/>
+              </a:solidFill>
+              <a:latin typeface="Arial"/>
+            </a:endParaRPr>
+          </a:p>
+          <a:p>
+            <a:pPr>
+              <a:lnSpc>
+                <a:spcPct val="115000"/>
+              </a:lnSpc>
+            </a:pPr>
+            <a:endParaRPr b="0" lang="en-US" sz="1200" spc="-1" strike="noStrike">
+              <a:solidFill>
+                <a:srgbClr val="000000"/>
+              </a:solidFill>
+              <a:latin typeface="Arial"/>
+            </a:endParaRPr>
+          </a:p>
+        </p:txBody>
+      </p:sp>
+    </p:spTree>
+  </p:cSld>
+  <mc:AlternateContent>
+    <mc:Choice Requires="p14">
+      <p:transition spd="slow" p14:dur="2000"/>
+    </mc:Choice>
+    <mc:Fallback>
+      <p:transition spd="slow"/>
+    </mc:Fallback>
+  </mc:AlternateContent>
+</p:sld>
+</file>
+
+<file path=ppt/slides/slide4.xml><?xml version="1.0" encoding="utf-8"?>
+<p:sld xmlns:a="http://schemas.openxmlformats.org/drawingml/2006/main" xmlns:p="http://schemas.openxmlformats.org/presentationml/2006/main" xmlns:r="http://schemas.openxmlformats.org/officeDocument/2006/relationships" xmlns:p14="http://schemas.microsoft.com/office/powerpoint/2010/main" xmlns:p15="http://schemas.microsoft.com/office/powerpoint/2012/main" xmlns:mc="http://schemas.openxmlformats.org/markup-compatibility/2006">
+  <p:cSld>
+    <p:spTree>
+      <p:nvGrpSpPr>
+        <p:cNvPr id="1" name=""/>
+        <p:cNvGrpSpPr/>
+        <p:nvPr/>
+      </p:nvGrpSpPr>
+      <p:grpSpPr>
+        <a:xfrm>
+          <a:off x="0" y="0"/>
+          <a:ext cx="0" cy="0"/>
+          <a:chOff x="0" y="0"/>
+          <a:chExt cx="0" cy="0"/>
+        </a:xfrm>
+      </p:grpSpPr>
+      <p:sp>
+        <p:nvSpPr>
+          <p:cNvPr id="176" name="TextShape 1"/>
+          <p:cNvSpPr txBox="1"/>
+          <p:nvPr/>
+        </p:nvSpPr>
+        <p:spPr>
+          <a:xfrm>
+            <a:off x="729360" y="1318680"/>
+            <a:ext cx="7688520" cy="534960"/>
+          </a:xfrm>
+          <a:prstGeom prst="rect">
+            <a:avLst/>
+          </a:prstGeom>
+          <a:noFill/>
+          <a:ln>
+            <a:noFill/>
+          </a:ln>
+        </p:spPr>
+        <p:txBody>
+          <a:bodyPr tIns="91440" bIns="91440">
+            <a:noAutofit/>
+          </a:bodyPr>
+          <a:p>
+            <a:pPr>
+              <a:lnSpc>
+                <a:spcPct val="100000"/>
+              </a:lnSpc>
+              <a:tabLst>
+                <a:tab algn="l" pos="0"/>
+              </a:tabLst>
+            </a:pPr>
+            <a:r>
+              <a:rPr b="1" lang="id" sz="2600" spc="-1" strike="noStrike">
+                <a:solidFill>
+                  <a:srgbClr val="1a1a1a"/>
+                </a:solidFill>
+                <a:latin typeface="Raleway"/>
+                <a:ea typeface="Raleway"/>
+              </a:rPr>
+              <a:t>Menghubungkan GitLocal dan GitServer</a:t>
+            </a:r>
+            <a:endParaRPr b="0" lang="en-US" sz="2600" spc="-1" strike="noStrike">
+              <a:solidFill>
+                <a:srgbClr val="000000"/>
+              </a:solidFill>
+              <a:latin typeface="Arial"/>
+            </a:endParaRPr>
+          </a:p>
+        </p:txBody>
+      </p:sp>
+      <p:sp>
+        <p:nvSpPr>
+          <p:cNvPr id="177" name="TextShape 2"/>
+          <p:cNvSpPr txBox="1"/>
+          <p:nvPr/>
+        </p:nvSpPr>
+        <p:spPr>
+          <a:xfrm>
+            <a:off x="729360" y="2079000"/>
+            <a:ext cx="7688520" cy="2260800"/>
+          </a:xfrm>
+          <a:prstGeom prst="rect">
+            <a:avLst/>
+          </a:prstGeom>
+          <a:noFill/>
+          <a:ln>
+            <a:noFill/>
+          </a:ln>
+        </p:spPr>
+        <p:txBody>
+          <a:bodyPr tIns="91440" bIns="91440">
+            <a:noAutofit/>
+          </a:bodyPr>
+          <a:p>
+            <a:pPr marL="457200" indent="-310680">
+              <a:lnSpc>
+                <a:spcPct val="115000"/>
+              </a:lnSpc>
+              <a:buClr>
+                <a:srgbClr val="595959"/>
+              </a:buClr>
+              <a:buFont typeface="Lato"/>
+              <a:buChar char="●"/>
+            </a:pPr>
+            <a:r>
+              <a:rPr b="0" lang="id" sz="1200" spc="-1" strike="noStrike">
+                <a:solidFill>
+                  <a:srgbClr val="595959"/>
+                </a:solidFill>
+                <a:latin typeface="Lato"/>
+                <a:ea typeface="Lato"/>
+              </a:rPr>
+              <a:t>Untuk menghubungkan repository local ke gitServer kita bisa menggunakan printah:</a:t>
+            </a:r>
+            <a:endParaRPr b="0" lang="en-US" sz="1200" spc="-1" strike="noStrike">
+              <a:solidFill>
+                <a:srgbClr val="000000"/>
+              </a:solidFill>
+              <a:latin typeface="Arial"/>
+            </a:endParaRPr>
+          </a:p>
+          <a:p>
+            <a:pPr lvl="1" marL="864000" indent="-324000">
+              <a:spcBef>
+                <a:spcPts val="1134"/>
+              </a:spcBef>
+              <a:buClr>
+                <a:srgbClr val="000000"/>
+              </a:buClr>
+              <a:buSzPct val="75000"/>
+              <a:buFont typeface="Symbol" charset="2"/>
+              <a:buChar char=""/>
+            </a:pPr>
+            <a:r>
+              <a:rPr b="1" lang="id" sz="1200" spc="-1" strike="noStrike">
+                <a:solidFill>
+                  <a:srgbClr val="595959"/>
+                </a:solidFill>
+                <a:latin typeface="Lato"/>
+                <a:ea typeface="Lato"/>
+              </a:rPr>
+              <a:t>git remote add [name] [ssh-url]</a:t>
+            </a:r>
+            <a:endParaRPr b="0" lang="en-US" sz="1200" spc="-1" strike="noStrike">
+              <a:solidFill>
+                <a:srgbClr val="000000"/>
+              </a:solidFill>
+              <a:latin typeface="Arial"/>
+            </a:endParaRPr>
+          </a:p>
+          <a:p>
+            <a:pPr lvl="1" marL="864000" indent="-324000">
+              <a:spcBef>
+                <a:spcPts val="1134"/>
+              </a:spcBef>
+              <a:buClr>
+                <a:srgbClr val="000000"/>
+              </a:buClr>
+              <a:buSzPct val="75000"/>
+              <a:buFont typeface="Symbol" charset="2"/>
+              <a:buChar char=""/>
+            </a:pPr>
+            <a:r>
+              <a:rPr b="1" lang="id" sz="1200" spc="-1" strike="noStrike">
+                <a:solidFill>
+                  <a:srgbClr val="595959"/>
+                </a:solidFill>
+                <a:latin typeface="Lato"/>
+                <a:ea typeface="Lato"/>
+              </a:rPr>
+              <a:t>Example : </a:t>
+            </a:r>
+            <a:r>
+              <a:rPr b="0" lang="id" sz="1200" spc="-1" strike="noStrike">
+                <a:solidFill>
+                  <a:srgbClr val="595959"/>
+                </a:solidFill>
+                <a:latin typeface="Lato"/>
+                <a:ea typeface="Lato"/>
+              </a:rPr>
+              <a:t>git remote add origin git@gitlab.com:meaku00000/repo-git.git</a:t>
+            </a:r>
+            <a:endParaRPr b="0" lang="en-US" sz="1200" spc="-1" strike="noStrike">
+              <a:solidFill>
+                <a:srgbClr val="000000"/>
+              </a:solidFill>
+              <a:latin typeface="Arial"/>
+            </a:endParaRPr>
+          </a:p>
+          <a:p>
+            <a:pPr marL="457200" indent="-310680">
+              <a:lnSpc>
+                <a:spcPct val="115000"/>
+              </a:lnSpc>
+              <a:buClr>
+                <a:srgbClr val="595959"/>
+              </a:buClr>
+              <a:buFont typeface="Lato"/>
+              <a:buChar char="●"/>
+            </a:pPr>
+            <a:r>
+              <a:rPr b="0" lang="id" sz="1200" spc="-1" strike="noStrike">
+                <a:solidFill>
+                  <a:srgbClr val="595959"/>
+                </a:solidFill>
+                <a:latin typeface="Lato"/>
+                <a:ea typeface="Lato"/>
+              </a:rPr>
+              <a:t>Untuk mengecek remote yang tersedia:</a:t>
+            </a:r>
+            <a:endParaRPr b="0" lang="en-US" sz="1200" spc="-1" strike="noStrike">
+              <a:solidFill>
+                <a:srgbClr val="000000"/>
+              </a:solidFill>
+              <a:latin typeface="Arial"/>
+            </a:endParaRPr>
+          </a:p>
+          <a:p>
+            <a:pPr lvl="1" marL="864000" indent="-324000">
+              <a:spcBef>
+                <a:spcPts val="1134"/>
+              </a:spcBef>
+              <a:buClr>
+                <a:srgbClr val="000000"/>
+              </a:buClr>
+              <a:buSzPct val="75000"/>
+              <a:buFont typeface="Symbol" charset="2"/>
+              <a:buChar char=""/>
+            </a:pPr>
+            <a:r>
+              <a:rPr b="1" lang="id" sz="1200" spc="-1" strike="noStrike">
+                <a:solidFill>
+                  <a:srgbClr val="595959"/>
+                </a:solidFill>
+                <a:latin typeface="Lato"/>
+                <a:ea typeface="Lato"/>
+              </a:rPr>
+              <a:t>git remote</a:t>
+            </a:r>
+            <a:endParaRPr b="0" lang="en-US" sz="1200" spc="-1" strike="noStrike">
+              <a:solidFill>
+                <a:srgbClr val="000000"/>
+              </a:solidFill>
+              <a:latin typeface="Arial"/>
+            </a:endParaRPr>
+          </a:p>
+          <a:p>
+            <a:pPr marL="457200" indent="-310680">
+              <a:lnSpc>
+                <a:spcPct val="115000"/>
+              </a:lnSpc>
+              <a:buClr>
+                <a:srgbClr val="595959"/>
+              </a:buClr>
+              <a:buFont typeface="Lato"/>
+              <a:buChar char="●"/>
+            </a:pPr>
+            <a:r>
+              <a:rPr b="0" lang="id" sz="1200" spc="-1" strike="noStrike">
+                <a:solidFill>
+                  <a:srgbClr val="595959"/>
+                </a:solidFill>
+                <a:latin typeface="Lato"/>
+                <a:ea typeface="Lato"/>
+              </a:rPr>
+              <a:t>Untuk Mengecek url dari remote local</a:t>
+            </a:r>
+            <a:endParaRPr b="0" lang="en-US" sz="1200" spc="-1" strike="noStrike">
+              <a:solidFill>
+                <a:srgbClr val="000000"/>
+              </a:solidFill>
+              <a:latin typeface="Arial"/>
+            </a:endParaRPr>
+          </a:p>
+          <a:p>
+            <a:pPr lvl="1" marL="864000" indent="-324000">
+              <a:spcBef>
+                <a:spcPts val="1134"/>
+              </a:spcBef>
+              <a:buClr>
+                <a:srgbClr val="000000"/>
+              </a:buClr>
+              <a:buSzPct val="75000"/>
+              <a:buFont typeface="Symbol" charset="2"/>
+              <a:buChar char=""/>
+            </a:pPr>
+            <a:r>
+              <a:rPr b="1" lang="id" sz="1200" spc="-1" strike="noStrike">
+                <a:solidFill>
+                  <a:srgbClr val="595959"/>
+                </a:solidFill>
+                <a:latin typeface="Lato"/>
+                <a:ea typeface="Lato"/>
+              </a:rPr>
+              <a:t>git remote get-url [name-remote]</a:t>
+            </a:r>
+            <a:endParaRPr b="0" lang="en-US" sz="1200" spc="-1" strike="noStrike">
+              <a:solidFill>
+                <a:srgbClr val="000000"/>
+              </a:solidFill>
+              <a:latin typeface="Arial"/>
+            </a:endParaRPr>
+          </a:p>
+          <a:p>
+            <a:pPr marL="457200" indent="-310680">
+              <a:lnSpc>
+                <a:spcPct val="115000"/>
+              </a:lnSpc>
+              <a:buClr>
+                <a:srgbClr val="595959"/>
+              </a:buClr>
+              <a:buFont typeface="Lato"/>
+              <a:buChar char="●"/>
+            </a:pPr>
+            <a:endParaRPr b="0" lang="en-US" sz="1200" spc="-1" strike="noStrike">
+              <a:solidFill>
+                <a:srgbClr val="000000"/>
+              </a:solidFill>
+              <a:latin typeface="Arial"/>
+            </a:endParaRPr>
+          </a:p>
+          <a:p>
+            <a:pPr marL="457200" indent="-310680">
+              <a:lnSpc>
+                <a:spcPct val="115000"/>
+              </a:lnSpc>
+              <a:buClr>
+                <a:srgbClr val="595959"/>
+              </a:buClr>
+              <a:buFont typeface="Lato"/>
+              <a:buChar char="●"/>
+            </a:pPr>
+            <a:endParaRPr b="0" lang="en-US" sz="1200" spc="-1" strike="noStrike">
+              <a:solidFill>
+                <a:srgbClr val="000000"/>
+              </a:solidFill>
+              <a:latin typeface="Arial"/>
+            </a:endParaRPr>
+          </a:p>
+          <a:p>
+            <a:pPr marL="457200" indent="-310680">
+              <a:lnSpc>
+                <a:spcPct val="115000"/>
+              </a:lnSpc>
+              <a:buClr>
+                <a:srgbClr val="595959"/>
+              </a:buClr>
+              <a:buFont typeface="Lato"/>
+              <a:buChar char="●"/>
+            </a:pPr>
+            <a:endParaRPr b="0" lang="en-US" sz="1200" spc="-1" strike="noStrike">
+              <a:solidFill>
+                <a:srgbClr val="000000"/>
+              </a:solidFill>
+              <a:latin typeface="Arial"/>
+            </a:endParaRPr>
+          </a:p>
+          <a:p>
+            <a:pPr>
+              <a:lnSpc>
+                <a:spcPct val="115000"/>
+              </a:lnSpc>
+            </a:pPr>
+            <a:endParaRPr b="0" lang="en-US" sz="1200" spc="-1" strike="noStrike">
+              <a:solidFill>
+                <a:srgbClr val="000000"/>
+              </a:solidFill>
+              <a:latin typeface="Arial"/>
+            </a:endParaRPr>
+          </a:p>
+        </p:txBody>
+      </p:sp>
+    </p:spTree>
+  </p:cSld>
+  <mc:AlternateContent>
+    <mc:Choice Requires="p14">
+      <p:transition spd="slow" p14:dur="2000"/>
+    </mc:Choice>
+    <mc:Fallback>
+      <p:transition spd="slow"/>
+    </mc:Fallback>
+  </mc:AlternateContent>
+</p:sld>
+</file>
+
+<file path=ppt/slides/slide5.xml><?xml version="1.0" encoding="utf-8"?>
+<p:sld xmlns:a="http://schemas.openxmlformats.org/drawingml/2006/main" xmlns:p="http://schemas.openxmlformats.org/presentationml/2006/main" xmlns:r="http://schemas.openxmlformats.org/officeDocument/2006/relationships" xmlns:p14="http://schemas.microsoft.com/office/powerpoint/2010/main" xmlns:p15="http://schemas.microsoft.com/office/powerpoint/2012/main" xmlns:mc="http://schemas.openxmlformats.org/markup-compatibility/2006">
+  <p:cSld>
+    <p:spTree>
+      <p:nvGrpSpPr>
+        <p:cNvPr id="1" name=""/>
+        <p:cNvGrpSpPr/>
+        <p:nvPr/>
+      </p:nvGrpSpPr>
+      <p:grpSpPr>
+        <a:xfrm>
+          <a:off x="0" y="0"/>
+          <a:ext cx="0" cy="0"/>
+          <a:chOff x="0" y="0"/>
+          <a:chExt cx="0" cy="0"/>
+        </a:xfrm>
+      </p:grpSpPr>
+      <p:sp>
+        <p:nvSpPr>
+          <p:cNvPr id="178" name="TextShape 1"/>
+          <p:cNvSpPr txBox="1"/>
+          <p:nvPr/>
+        </p:nvSpPr>
+        <p:spPr>
+          <a:xfrm>
+            <a:off x="729360" y="1318680"/>
+            <a:ext cx="7688520" cy="534960"/>
+          </a:xfrm>
+          <a:prstGeom prst="rect">
+            <a:avLst/>
+          </a:prstGeom>
+          <a:noFill/>
+          <a:ln>
+            <a:noFill/>
+          </a:ln>
+        </p:spPr>
+        <p:txBody>
+          <a:bodyPr tIns="91440" bIns="91440">
+            <a:noAutofit/>
+          </a:bodyPr>
+          <a:p>
+            <a:pPr>
+              <a:lnSpc>
+                <a:spcPct val="100000"/>
+              </a:lnSpc>
+              <a:tabLst>
+                <a:tab algn="l" pos="0"/>
+              </a:tabLst>
+            </a:pPr>
+            <a:r>
+              <a:rPr b="1" lang="id" sz="2600" spc="-1" strike="noStrike">
+                <a:solidFill>
+                  <a:srgbClr val="1a1a1a"/>
+                </a:solidFill>
+                <a:latin typeface="Raleway"/>
+                <a:ea typeface="Raleway"/>
+              </a:rPr>
+              <a:t>Menghapus Remote</a:t>
+            </a:r>
+            <a:endParaRPr b="0" lang="en-US" sz="2600" spc="-1" strike="noStrike">
+              <a:solidFill>
+                <a:srgbClr val="000000"/>
+              </a:solidFill>
+              <a:latin typeface="Arial"/>
+            </a:endParaRPr>
+          </a:p>
+        </p:txBody>
+      </p:sp>
+      <p:sp>
+        <p:nvSpPr>
+          <p:cNvPr id="179" name="TextShape 2"/>
+          <p:cNvSpPr txBox="1"/>
+          <p:nvPr/>
+        </p:nvSpPr>
+        <p:spPr>
+          <a:xfrm>
+            <a:off x="729360" y="2079000"/>
+            <a:ext cx="7688520" cy="2260800"/>
+          </a:xfrm>
+          <a:prstGeom prst="rect">
+            <a:avLst/>
+          </a:prstGeom>
+          <a:noFill/>
+          <a:ln>
+            <a:noFill/>
+          </a:ln>
+        </p:spPr>
+        <p:txBody>
+          <a:bodyPr tIns="91440" bIns="91440">
+            <a:noAutofit/>
+          </a:bodyPr>
+          <a:p>
+            <a:pPr marL="457200" indent="-310680">
+              <a:lnSpc>
+                <a:spcPct val="115000"/>
+              </a:lnSpc>
+              <a:buClr>
+                <a:srgbClr val="595959"/>
+              </a:buClr>
+              <a:buFont typeface="Lato"/>
+              <a:buChar char="●"/>
+            </a:pPr>
+            <a:r>
+              <a:rPr b="0" lang="id" sz="1200" spc="-1" strike="noStrike">
+                <a:solidFill>
+                  <a:srgbClr val="595959"/>
+                </a:solidFill>
+                <a:latin typeface="Lato"/>
+                <a:ea typeface="Lato"/>
+              </a:rPr>
+              <a:t>Untuk menghapus remote</a:t>
+            </a:r>
+            <a:endParaRPr b="0" lang="en-US" sz="1200" spc="-1" strike="noStrike">
+              <a:solidFill>
+                <a:srgbClr val="000000"/>
+              </a:solidFill>
+              <a:latin typeface="Arial"/>
+            </a:endParaRPr>
+          </a:p>
+          <a:p>
+            <a:pPr lvl="1" marL="864000" indent="-324000">
+              <a:spcBef>
+                <a:spcPts val="1134"/>
+              </a:spcBef>
+              <a:buClr>
+                <a:srgbClr val="000000"/>
+              </a:buClr>
+              <a:buSzPct val="75000"/>
+              <a:buFont typeface="Symbol" charset="2"/>
+              <a:buChar char=""/>
+            </a:pPr>
+            <a:r>
+              <a:rPr b="1" lang="id" sz="1200" spc="-1" strike="noStrike">
+                <a:solidFill>
+                  <a:srgbClr val="595959"/>
+                </a:solidFill>
+                <a:latin typeface="Lato"/>
+                <a:ea typeface="Lato"/>
+              </a:rPr>
+              <a:t>git remote rm origin</a:t>
+            </a:r>
+            <a:endParaRPr b="0" lang="en-US" sz="1200" spc="-1" strike="noStrike">
+              <a:solidFill>
+                <a:srgbClr val="000000"/>
+              </a:solidFill>
+              <a:latin typeface="Arial"/>
+            </a:endParaRPr>
+          </a:p>
+          <a:p>
+            <a:pPr marL="457200" indent="-310680">
+              <a:lnSpc>
+                <a:spcPct val="115000"/>
+              </a:lnSpc>
+              <a:buClr>
+                <a:srgbClr val="595959"/>
+              </a:buClr>
+              <a:buFont typeface="Lato"/>
+              <a:buChar char="●"/>
+            </a:pPr>
+            <a:endParaRPr b="0" lang="en-US" sz="1200" spc="-1" strike="noStrike">
+              <a:solidFill>
+                <a:srgbClr val="000000"/>
+              </a:solidFill>
+              <a:latin typeface="Arial"/>
+            </a:endParaRPr>
+          </a:p>
+          <a:p>
+            <a:pPr marL="457200" indent="-310680">
+              <a:lnSpc>
+                <a:spcPct val="115000"/>
+              </a:lnSpc>
+              <a:buClr>
+                <a:srgbClr val="595959"/>
+              </a:buClr>
+              <a:buFont typeface="Lato"/>
+              <a:buChar char="●"/>
+            </a:pPr>
+            <a:endParaRPr b="0" lang="en-US" sz="1200" spc="-1" strike="noStrike">
+              <a:solidFill>
+                <a:srgbClr val="000000"/>
+              </a:solidFill>
+              <a:latin typeface="Arial"/>
+            </a:endParaRPr>
+          </a:p>
+          <a:p>
+            <a:pPr marL="457200" indent="-310680">
+              <a:lnSpc>
+                <a:spcPct val="115000"/>
+              </a:lnSpc>
+              <a:buClr>
+                <a:srgbClr val="595959"/>
+              </a:buClr>
+              <a:buFont typeface="Lato"/>
+              <a:buChar char="●"/>
+            </a:pPr>
+            <a:endParaRPr b="0" lang="en-US" sz="1200" spc="-1" strike="noStrike">
+              <a:solidFill>
+                <a:srgbClr val="000000"/>
+              </a:solidFill>
+              <a:latin typeface="Arial"/>
+            </a:endParaRPr>
+          </a:p>
+          <a:p>
+            <a:pPr>
+              <a:lnSpc>
+                <a:spcPct val="115000"/>
+              </a:lnSpc>
+            </a:pPr>
+            <a:endParaRPr b="0" lang="en-US" sz="1200" spc="-1" strike="noStrike">
+              <a:solidFill>
+                <a:srgbClr val="000000"/>
+              </a:solidFill>
+              <a:latin typeface="Arial"/>
+            </a:endParaRPr>
+          </a:p>
+        </p:txBody>
+      </p:sp>
+    </p:spTree>
+  </p:cSld>
+  <mc:AlternateContent>
+    <mc:Choice Requires="p14">
+      <p:transition spd="slow" p14:dur="2000"/>
+    </mc:Choice>
+    <mc:Fallback>
+      <p:transition spd="slow"/>
+    </mc:Fallback>
+  </mc:AlternateContent>
+</p:sld>
+</file>
+
+<file path=ppt/slides/slide6.xml><?xml version="1.0" encoding="utf-8"?>
+<p:sld xmlns:a="http://schemas.openxmlformats.org/drawingml/2006/main" xmlns:p="http://schemas.openxmlformats.org/presentationml/2006/main" xmlns:r="http://schemas.openxmlformats.org/officeDocument/2006/relationships" xmlns:p14="http://schemas.microsoft.com/office/powerpoint/2010/main" xmlns:p15="http://schemas.microsoft.com/office/powerpoint/2012/main" xmlns:mc="http://schemas.openxmlformats.org/markup-compatibility/2006">
+  <p:cSld>
+    <p:spTree>
+      <p:nvGrpSpPr>
+        <p:cNvPr id="1" name=""/>
+        <p:cNvGrpSpPr/>
+        <p:nvPr/>
+      </p:nvGrpSpPr>
+      <p:grpSpPr>
+        <a:xfrm>
+          <a:off x="0" y="0"/>
+          <a:ext cx="0" cy="0"/>
+          <a:chOff x="0" y="0"/>
+          <a:chExt cx="0" cy="0"/>
+        </a:xfrm>
+      </p:grpSpPr>
+      <p:sp>
+        <p:nvSpPr>
+          <p:cNvPr id="180" name="TextShape 1"/>
+          <p:cNvSpPr txBox="1"/>
+          <p:nvPr/>
+        </p:nvSpPr>
+        <p:spPr>
+          <a:xfrm>
+            <a:off x="729360" y="1322280"/>
+            <a:ext cx="7688160" cy="1518120"/>
+          </a:xfrm>
+          <a:prstGeom prst="rect">
+            <a:avLst/>
+          </a:prstGeom>
+          <a:noFill/>
+          <a:ln>
+            <a:noFill/>
+          </a:ln>
+        </p:spPr>
+        <p:txBody>
+          <a:bodyPr tIns="91440" bIns="91440">
+            <a:noAutofit/>
+          </a:bodyPr>
+          <a:p>
+            <a:pPr>
+              <a:lnSpc>
+                <a:spcPct val="100000"/>
+              </a:lnSpc>
+              <a:tabLst>
+                <a:tab algn="l" pos="0"/>
+              </a:tabLst>
+            </a:pPr>
+            <a:r>
+              <a:rPr b="1" lang="id" sz="3600" spc="-1" strike="noStrike">
+                <a:solidFill>
+                  <a:srgbClr val="ffffff"/>
+                </a:solidFill>
+                <a:latin typeface="Raleway"/>
+                <a:ea typeface="Raleway"/>
+              </a:rPr>
+              <a:t>Git Push</a:t>
+            </a:r>
+            <a:endParaRPr b="0" lang="en-US" sz="3600" spc="-1" strike="noStrike">
+              <a:solidFill>
+                <a:srgbClr val="000000"/>
+              </a:solidFill>
+              <a:latin typeface="Arial"/>
+            </a:endParaRPr>
+          </a:p>
+        </p:txBody>
+      </p:sp>
+    </p:spTree>
+  </p:cSld>
+  <mc:AlternateContent>
+    <mc:Choice Requires="p14">
+      <p:transition spd="slow" p14:dur="2000"/>
+    </mc:Choice>
+    <mc:Fallback>
+      <p:transition spd="slow"/>
+    </mc:Fallback>
+  </mc:AlternateContent>
+</p:sld>
+</file>
+
+<file path=ppt/slides/slide7.xml><?xml version="1.0" encoding="utf-8"?>
+<p:sld xmlns:a="http://schemas.openxmlformats.org/drawingml/2006/main" xmlns:p="http://schemas.openxmlformats.org/presentationml/2006/main" xmlns:r="http://schemas.openxmlformats.org/officeDocument/2006/relationships" xmlns:p14="http://schemas.microsoft.com/office/powerpoint/2010/main" xmlns:p15="http://schemas.microsoft.com/office/powerpoint/2012/main" xmlns:mc="http://schemas.openxmlformats.org/markup-compatibility/2006">
+  <p:cSld>
+    <p:spTree>
+      <p:nvGrpSpPr>
+        <p:cNvPr id="1" name=""/>
+        <p:cNvGrpSpPr/>
+        <p:nvPr/>
+      </p:nvGrpSpPr>
+      <p:grpSpPr>
+        <a:xfrm>
+          <a:off x="0" y="0"/>
+          <a:ext cx="0" cy="0"/>
+          <a:chOff x="0" y="0"/>
+          <a:chExt cx="0" cy="0"/>
+        </a:xfrm>
+      </p:grpSpPr>
+      <p:sp>
+        <p:nvSpPr>
+          <p:cNvPr id="181" name="TextShape 1"/>
+          <p:cNvSpPr txBox="1"/>
+          <p:nvPr/>
+        </p:nvSpPr>
+        <p:spPr>
+          <a:xfrm>
+            <a:off x="729360" y="1318680"/>
+            <a:ext cx="7688520" cy="534960"/>
+          </a:xfrm>
+          <a:prstGeom prst="rect">
+            <a:avLst/>
+          </a:prstGeom>
+          <a:noFill/>
+          <a:ln>
+            <a:noFill/>
+          </a:ln>
+        </p:spPr>
+        <p:txBody>
+          <a:bodyPr tIns="91440" bIns="91440">
+            <a:noAutofit/>
+          </a:bodyPr>
+          <a:p>
+            <a:pPr>
+              <a:lnSpc>
+                <a:spcPct val="100000"/>
+              </a:lnSpc>
+              <a:tabLst>
+                <a:tab algn="l" pos="0"/>
+              </a:tabLst>
+            </a:pPr>
+            <a:r>
+              <a:rPr b="1" lang="id" sz="2600" spc="-1" strike="noStrike">
+                <a:solidFill>
+                  <a:srgbClr val="1a1a1a"/>
+                </a:solidFill>
+                <a:latin typeface="Raleway"/>
+                <a:ea typeface="Raleway"/>
+              </a:rPr>
+              <a:t>Git Push</a:t>
+            </a:r>
+            <a:endParaRPr b="0" lang="en-US" sz="2600" spc="-1" strike="noStrike">
+              <a:solidFill>
+                <a:srgbClr val="000000"/>
+              </a:solidFill>
+              <a:latin typeface="Arial"/>
+            </a:endParaRPr>
+          </a:p>
+        </p:txBody>
+      </p:sp>
+      <p:sp>
+        <p:nvSpPr>
+          <p:cNvPr id="182" name="TextShape 2"/>
+          <p:cNvSpPr txBox="1"/>
+          <p:nvPr/>
+        </p:nvSpPr>
+        <p:spPr>
+          <a:xfrm>
+            <a:off x="729360" y="2079000"/>
+            <a:ext cx="7688520" cy="2260800"/>
+          </a:xfrm>
+          <a:prstGeom prst="rect">
+            <a:avLst/>
+          </a:prstGeom>
+          <a:noFill/>
+          <a:ln>
+            <a:noFill/>
+          </a:ln>
+        </p:spPr>
+        <p:txBody>
+          <a:bodyPr tIns="91440" bIns="91440">
+            <a:noAutofit/>
+          </a:bodyPr>
+          <a:p>
+            <a:pPr marL="457200" indent="-310680">
+              <a:lnSpc>
+                <a:spcPct val="115000"/>
+              </a:lnSpc>
+              <a:buClr>
+                <a:srgbClr val="595959"/>
+              </a:buClr>
+              <a:buFont typeface="Lato"/>
+              <a:buChar char="●"/>
+            </a:pPr>
+            <a:r>
+              <a:rPr b="0" lang="id" sz="1200" spc="-1" strike="noStrike">
+                <a:solidFill>
+                  <a:srgbClr val="595959"/>
+                </a:solidFill>
+                <a:latin typeface="Lato"/>
+                <a:ea typeface="Lato"/>
+              </a:rPr>
+              <a:t>Untuk mengirim perubahan branch ke remote dengan nama branch yang sama</a:t>
+            </a:r>
+            <a:endParaRPr b="0" lang="en-US" sz="1200" spc="-1" strike="noStrike">
+              <a:solidFill>
+                <a:srgbClr val="000000"/>
+              </a:solidFill>
+              <a:latin typeface="Arial"/>
+            </a:endParaRPr>
+          </a:p>
+          <a:p>
+            <a:pPr lvl="1" marL="864000" indent="-324000">
+              <a:spcBef>
+                <a:spcPts val="1134"/>
+              </a:spcBef>
+              <a:buClr>
+                <a:srgbClr val="000000"/>
+              </a:buClr>
+              <a:buSzPct val="75000"/>
+              <a:buFont typeface="Symbol" charset="2"/>
+              <a:buChar char=""/>
+            </a:pPr>
+            <a:r>
+              <a:rPr b="1" lang="id" sz="1200" spc="-1" strike="noStrike">
+                <a:solidFill>
+                  <a:srgbClr val="595959"/>
+                </a:solidFill>
+                <a:latin typeface="Lato"/>
+                <a:ea typeface="Lato"/>
+              </a:rPr>
+              <a:t>git push [nama_remote] [local_branch]</a:t>
+            </a:r>
+            <a:endParaRPr b="0" lang="en-US" sz="1200" spc="-1" strike="noStrike">
+              <a:solidFill>
+                <a:srgbClr val="000000"/>
+              </a:solidFill>
+              <a:latin typeface="Arial"/>
+            </a:endParaRPr>
+          </a:p>
+          <a:p>
+            <a:pPr marL="457200" indent="-310680">
+              <a:lnSpc>
+                <a:spcPct val="115000"/>
+              </a:lnSpc>
+              <a:buClr>
+                <a:srgbClr val="595959"/>
+              </a:buClr>
+              <a:buFont typeface="Lato"/>
+              <a:buChar char="●"/>
+            </a:pPr>
+            <a:r>
+              <a:rPr b="0" lang="id" sz="1200" spc="-1" strike="noStrike">
+                <a:solidFill>
+                  <a:srgbClr val="595959"/>
+                </a:solidFill>
+                <a:latin typeface="Lato"/>
+                <a:ea typeface="Lato"/>
+              </a:rPr>
+              <a:t>Untuk mengirim perubahan branch ke remote dnegnan nama branch yang beda</a:t>
+            </a:r>
+            <a:endParaRPr b="0" lang="en-US" sz="1200" spc="-1" strike="noStrike">
+              <a:solidFill>
+                <a:srgbClr val="000000"/>
+              </a:solidFill>
+              <a:latin typeface="Arial"/>
+            </a:endParaRPr>
+          </a:p>
+          <a:p>
+            <a:pPr lvl="1" marL="864000" indent="-324000">
+              <a:spcBef>
+                <a:spcPts val="1134"/>
+              </a:spcBef>
+              <a:buClr>
+                <a:srgbClr val="000000"/>
+              </a:buClr>
+              <a:buSzPct val="75000"/>
+              <a:buFont typeface="Symbol" charset="2"/>
+              <a:buChar char=""/>
+            </a:pPr>
+            <a:r>
+              <a:rPr b="1" lang="id" sz="1200" spc="-1" strike="noStrike">
+                <a:solidFill>
+                  <a:srgbClr val="595959"/>
+                </a:solidFill>
+                <a:latin typeface="Lato"/>
+                <a:ea typeface="Lato"/>
+              </a:rPr>
+              <a:t>git push [nama_remote] [local_branch]:[nama_branch_baru]</a:t>
+            </a:r>
+            <a:endParaRPr b="0" lang="en-US" sz="1200" spc="-1" strike="noStrike">
+              <a:solidFill>
+                <a:srgbClr val="000000"/>
+              </a:solidFill>
+              <a:latin typeface="Arial"/>
+            </a:endParaRPr>
+          </a:p>
+          <a:p>
+            <a:pPr marL="457200" indent="-310680">
+              <a:lnSpc>
+                <a:spcPct val="115000"/>
+              </a:lnSpc>
+              <a:buClr>
+                <a:srgbClr val="595959"/>
+              </a:buClr>
+              <a:buFont typeface="Lato"/>
+              <a:buChar char="●"/>
+            </a:pPr>
+            <a:r>
+              <a:rPr b="0" lang="id" sz="1200" spc="-1" strike="noStrike">
+                <a:solidFill>
+                  <a:srgbClr val="595959"/>
+                </a:solidFill>
+                <a:latin typeface="Lato"/>
+                <a:ea typeface="Lato"/>
+              </a:rPr>
+              <a:t>Untuk mengirim perubahan semua branch dari local ke server</a:t>
+            </a:r>
+            <a:endParaRPr b="0" lang="en-US" sz="1200" spc="-1" strike="noStrike">
+              <a:solidFill>
+                <a:srgbClr val="000000"/>
+              </a:solidFill>
+              <a:latin typeface="Arial"/>
+            </a:endParaRPr>
+          </a:p>
+          <a:p>
+            <a:pPr lvl="1" marL="864000" indent="-324000">
+              <a:spcBef>
+                <a:spcPts val="1134"/>
+              </a:spcBef>
+              <a:buClr>
+                <a:srgbClr val="000000"/>
+              </a:buClr>
+              <a:buSzPct val="75000"/>
+              <a:buFont typeface="Symbol" charset="2"/>
+              <a:buChar char=""/>
+            </a:pPr>
+            <a:r>
+              <a:rPr b="1" lang="id" sz="1200" spc="-1" strike="noStrike">
+                <a:solidFill>
+                  <a:srgbClr val="595959"/>
+                </a:solidFill>
+                <a:latin typeface="Lato"/>
+                <a:ea typeface="Lato"/>
+              </a:rPr>
+              <a:t>git push [nama_remote] --all</a:t>
+            </a:r>
+            <a:endParaRPr b="0" lang="en-US" sz="1200" spc="-1" strike="noStrike">
+              <a:solidFill>
+                <a:srgbClr val="000000"/>
+              </a:solidFill>
+              <a:latin typeface="Arial"/>
+            </a:endParaRPr>
+          </a:p>
+        </p:txBody>
+      </p:sp>
+    </p:spTree>
+  </p:cSld>
+  <mc:AlternateContent>
+    <mc:Choice Requires="p14">
+      <p:transition spd="slow" p14:dur="2000"/>
+    </mc:Choice>
+    <mc:Fallback>
+      <p:transition spd="slow"/>
+    </mc:Fallback>
+  </mc:AlternateContent>
+</p:sld>
+</file>
+
+<file path=ppt/slides/slide8.xml><?xml version="1.0" encoding="utf-8"?>
+<p:sld xmlns:a="http://schemas.openxmlformats.org/drawingml/2006/main" xmlns:p="http://schemas.openxmlformats.org/presentationml/2006/main" xmlns:r="http://schemas.openxmlformats.org/officeDocument/2006/relationships" xmlns:p14="http://schemas.microsoft.com/office/powerpoint/2010/main" xmlns:p15="http://schemas.microsoft.com/office/powerpoint/2012/main" xmlns:mc="http://schemas.openxmlformats.org/markup-compatibility/2006">
+  <p:cSld>
+    <p:spTree>
+      <p:nvGrpSpPr>
+        <p:cNvPr id="1" name=""/>
+        <p:cNvGrpSpPr/>
+        <p:nvPr/>
+      </p:nvGrpSpPr>
+      <p:grpSpPr>
+        <a:xfrm>
+          <a:off x="0" y="0"/>
+          <a:ext cx="0" cy="0"/>
+          <a:chOff x="0" y="0"/>
+          <a:chExt cx="0" cy="0"/>
+        </a:xfrm>
+      </p:grpSpPr>
+      <p:sp>
+        <p:nvSpPr>
+          <p:cNvPr id="183" name="TextShape 1"/>
+          <p:cNvSpPr txBox="1"/>
+          <p:nvPr/>
+        </p:nvSpPr>
+        <p:spPr>
+          <a:xfrm>
+            <a:off x="729360" y="1318680"/>
+            <a:ext cx="7688520" cy="534960"/>
+          </a:xfrm>
+          <a:prstGeom prst="rect">
+            <a:avLst/>
+          </a:prstGeom>
+          <a:noFill/>
+          <a:ln>
+            <a:noFill/>
+          </a:ln>
+        </p:spPr>
+        <p:txBody>
+          <a:bodyPr tIns="91440" bIns="91440">
+            <a:noAutofit/>
+          </a:bodyPr>
+          <a:p>
+            <a:pPr>
+              <a:lnSpc>
+                <a:spcPct val="100000"/>
+              </a:lnSpc>
+              <a:tabLst>
+                <a:tab algn="l" pos="0"/>
+              </a:tabLst>
+            </a:pPr>
+            <a:r>
+              <a:rPr b="1" lang="id" sz="2600" spc="-1" strike="noStrike">
+                <a:solidFill>
+                  <a:srgbClr val="1a1a1a"/>
+                </a:solidFill>
+                <a:latin typeface="Raleway"/>
+                <a:ea typeface="Raleway"/>
+              </a:rPr>
+              <a:t>Delete Branch di remote repository</a:t>
+            </a:r>
+            <a:endParaRPr b="0" lang="en-US" sz="2600" spc="-1" strike="noStrike">
+              <a:solidFill>
+                <a:srgbClr val="000000"/>
+              </a:solidFill>
+              <a:latin typeface="Arial"/>
+            </a:endParaRPr>
+          </a:p>
+        </p:txBody>
+      </p:sp>
+      <p:sp>
+        <p:nvSpPr>
+          <p:cNvPr id="184" name="TextShape 2"/>
+          <p:cNvSpPr txBox="1"/>
+          <p:nvPr/>
+        </p:nvSpPr>
+        <p:spPr>
+          <a:xfrm>
+            <a:off x="729360" y="2079000"/>
+            <a:ext cx="7688520" cy="2260800"/>
+          </a:xfrm>
+          <a:prstGeom prst="rect">
+            <a:avLst/>
+          </a:prstGeom>
+          <a:noFill/>
+          <a:ln>
+            <a:noFill/>
+          </a:ln>
+        </p:spPr>
+        <p:txBody>
+          <a:bodyPr tIns="91440" bIns="91440">
+            <a:noAutofit/>
+          </a:bodyPr>
+          <a:p>
+            <a:pPr marL="457200" indent="-310680">
+              <a:lnSpc>
+                <a:spcPct val="115000"/>
+              </a:lnSpc>
+              <a:buClr>
+                <a:srgbClr val="595959"/>
+              </a:buClr>
+              <a:buFont typeface="Lato"/>
+              <a:buChar char="●"/>
+            </a:pPr>
+            <a:r>
+              <a:rPr b="0" lang="id" sz="1200" spc="-1" strike="noStrike">
+                <a:solidFill>
+                  <a:srgbClr val="595959"/>
+                </a:solidFill>
+                <a:latin typeface="Lato"/>
+                <a:ea typeface="Lato"/>
+              </a:rPr>
+              <a:t>Untuk menghapus branch dari local ke server menggunakan perintah:</a:t>
+            </a:r>
+            <a:endParaRPr b="0" lang="en-US" sz="1200" spc="-1" strike="noStrike">
+              <a:solidFill>
+                <a:srgbClr val="000000"/>
+              </a:solidFill>
+              <a:latin typeface="Arial"/>
+            </a:endParaRPr>
+          </a:p>
+          <a:p>
+            <a:pPr lvl="1" marL="864000" indent="-324000">
+              <a:spcBef>
+                <a:spcPts val="1134"/>
+              </a:spcBef>
+              <a:buClr>
+                <a:srgbClr val="000000"/>
+              </a:buClr>
+              <a:buSzPct val="75000"/>
+              <a:buFont typeface="Symbol" charset="2"/>
+              <a:buChar char=""/>
+            </a:pPr>
+            <a:r>
+              <a:rPr b="1" lang="id" sz="1200" spc="-1" strike="noStrike">
+                <a:solidFill>
+                  <a:srgbClr val="595959"/>
+                </a:solidFill>
+                <a:latin typeface="Lato"/>
+                <a:ea typeface="Lato"/>
+              </a:rPr>
+              <a:t>git push –-delete [namremote] [nama_branch]</a:t>
+            </a:r>
+            <a:endParaRPr b="0" lang="en-US" sz="1200" spc="-1" strike="noStrike">
+              <a:solidFill>
+                <a:srgbClr val="000000"/>
+              </a:solidFill>
+              <a:latin typeface="Arial"/>
+            </a:endParaRPr>
+          </a:p>
+          <a:p>
+            <a:pPr lvl="1" marL="864000" indent="-324000">
+              <a:spcBef>
+                <a:spcPts val="1134"/>
+              </a:spcBef>
+              <a:buClr>
+                <a:srgbClr val="000000"/>
+              </a:buClr>
+              <a:buSzPct val="75000"/>
+              <a:buFont typeface="Symbol" charset="2"/>
+              <a:buChar char=""/>
+            </a:pPr>
+            <a:r>
+              <a:rPr b="1" lang="id" sz="1200" spc="-1" strike="noStrike">
+                <a:solidFill>
+                  <a:srgbClr val="595959"/>
+                </a:solidFill>
+                <a:latin typeface="Lato"/>
+                <a:ea typeface="Lato"/>
+              </a:rPr>
+              <a:t>Ex: git push –-delete repohub fiture</a:t>
+            </a:r>
+            <a:endParaRPr b="0" lang="en-US" sz="1200" spc="-1" strike="noStrike">
+              <a:solidFill>
+                <a:srgbClr val="000000"/>
+              </a:solidFill>
+              <a:latin typeface="Arial"/>
+            </a:endParaRPr>
+          </a:p>
+          <a:p>
+            <a:pPr marL="457200" indent="-310680">
+              <a:lnSpc>
+                <a:spcPct val="115000"/>
+              </a:lnSpc>
+              <a:buClr>
+                <a:srgbClr val="595959"/>
+              </a:buClr>
+              <a:buFont typeface="Lato"/>
+              <a:buChar char="●"/>
+            </a:pPr>
+            <a:r>
+              <a:rPr b="0" lang="id" sz="1200" spc="-1" strike="noStrike">
+                <a:solidFill>
+                  <a:srgbClr val="595959"/>
+                </a:solidFill>
+                <a:latin typeface="Lato"/>
+                <a:ea typeface="Lato"/>
+              </a:rPr>
+              <a:t>Artinya menghapus branch </a:t>
+            </a:r>
+            <a:r>
+              <a:rPr b="1" lang="id" sz="1200" spc="-1" strike="noStrike">
+                <a:solidFill>
+                  <a:srgbClr val="595959"/>
+                </a:solidFill>
+                <a:latin typeface="Lato"/>
+                <a:ea typeface="Lato"/>
+              </a:rPr>
+              <a:t>fiture </a:t>
+            </a:r>
+            <a:r>
+              <a:rPr b="0" lang="id" sz="1200" spc="-1" strike="noStrike">
+                <a:solidFill>
+                  <a:srgbClr val="595959"/>
+                </a:solidFill>
+                <a:latin typeface="Lato"/>
+                <a:ea typeface="Lato"/>
+              </a:rPr>
+              <a:t>di repository </a:t>
+            </a:r>
+            <a:r>
+              <a:rPr b="1" lang="id" sz="1200" spc="-1" strike="noStrike">
+                <a:solidFill>
+                  <a:srgbClr val="595959"/>
+                </a:solidFill>
+                <a:latin typeface="Lato"/>
+                <a:ea typeface="Lato"/>
+              </a:rPr>
+              <a:t>repohub </a:t>
+            </a:r>
+            <a:endParaRPr b="0" lang="en-US" sz="1200" spc="-1" strike="noStrike">
+              <a:solidFill>
+                <a:srgbClr val="000000"/>
+              </a:solidFill>
+              <a:latin typeface="Arial"/>
+            </a:endParaRPr>
+          </a:p>
+          <a:p>
+            <a:pPr marL="457200" indent="-310680">
+              <a:lnSpc>
+                <a:spcPct val="115000"/>
+              </a:lnSpc>
+              <a:buClr>
+                <a:srgbClr val="595959"/>
+              </a:buClr>
+              <a:buFont typeface="Lato"/>
+              <a:buChar char="●"/>
+            </a:pPr>
+            <a:endParaRPr b="0" lang="en-US" sz="1200" spc="-1" strike="noStrike">
+              <a:solidFill>
+                <a:srgbClr val="000000"/>
+              </a:solidFill>
+              <a:latin typeface="Arial"/>
+            </a:endParaRPr>
+          </a:p>
+        </p:txBody>
+      </p:sp>
+    </p:spTree>
+  </p:cSld>
+  <mc:AlternateContent>
+    <mc:Choice Requires="p14">
+      <p:transition spd="slow" p14:dur="2000"/>
+    </mc:Choice>
+    <mc:Fallback>
+      <p:transition spd="slow"/>
+    </mc:Fallback>
+  </mc:AlternateContent>
+</p:sld>
+</file>
+
+<file path=ppt/slides/slide9.xml><?xml version="1.0" encoding="utf-8"?>
+<p:sld xmlns:a="http://schemas.openxmlformats.org/drawingml/2006/main" xmlns:p="http://schemas.openxmlformats.org/presentationml/2006/main" xmlns:r="http://schemas.openxmlformats.org/officeDocument/2006/relationships" xmlns:p14="http://schemas.microsoft.com/office/powerpoint/2010/main" xmlns:p15="http://schemas.microsoft.com/office/powerpoint/2012/main" xmlns:mc="http://schemas.openxmlformats.org/markup-compatibility/2006">
+  <p:cSld>
+    <p:spTree>
+      <p:nvGrpSpPr>
+        <p:cNvPr id="1" name=""/>
+        <p:cNvGrpSpPr/>
+        <p:nvPr/>
+      </p:nvGrpSpPr>
+      <p:grpSpPr>
+        <a:xfrm>
+          <a:off x="0" y="0"/>
+          <a:ext cx="0" cy="0"/>
+          <a:chOff x="0" y="0"/>
+          <a:chExt cx="0" cy="0"/>
+        </a:xfrm>
+      </p:grpSpPr>
+      <p:sp>
+        <p:nvSpPr>
+          <p:cNvPr id="185" name="TextShape 1"/>
+          <p:cNvSpPr txBox="1"/>
+          <p:nvPr/>
+        </p:nvSpPr>
+        <p:spPr>
+          <a:xfrm>
+            <a:off x="729360" y="1322280"/>
+            <a:ext cx="7688160" cy="1518120"/>
+          </a:xfrm>
+          <a:prstGeom prst="rect">
+            <a:avLst/>
+          </a:prstGeom>
+          <a:noFill/>
+          <a:ln>
+            <a:noFill/>
+          </a:ln>
+        </p:spPr>
+        <p:txBody>
+          <a:bodyPr tIns="91440" bIns="91440">
+            <a:noAutofit/>
+          </a:bodyPr>
+          <a:p>
+            <a:pPr>
+              <a:lnSpc>
+                <a:spcPct val="100000"/>
+              </a:lnSpc>
+              <a:tabLst>
+                <a:tab algn="l" pos="0"/>
+              </a:tabLst>
+            </a:pPr>
+            <a:r>
+              <a:rPr b="1" lang="id" sz="3600" spc="-1" strike="noStrike">
+                <a:solidFill>
+                  <a:srgbClr val="ffffff"/>
+                </a:solidFill>
+                <a:latin typeface="Raleway"/>
+                <a:ea typeface="Raleway"/>
+              </a:rPr>
+              <a:t>Git Clone</a:t>
+            </a:r>
+            <a:endParaRPr b="0" lang="en-US" sz="3600" spc="-1" strike="noStrike">
               <a:solidFill>
                 <a:srgbClr val="000000"/>
               </a:solidFill>
@@ -6882,4 +10480,230 @@
     </a:fmtScheme>
   </a:themeElements>
 </a:theme>
+</file>
+
+<file path=ppt/theme/theme4.xml><?xml version="1.0" encoding="utf-8"?>
+<a:theme xmlns:a="http://schemas.openxmlformats.org/drawingml/2006/main" name="Office Theme">
+  <a:themeElements>
+    <a:clrScheme name="Office">
+      <a:dk1>
+        <a:sysClr val="windowText" lastClr="000000"/>
+      </a:dk1>
+      <a:lt1>
+        <a:sysClr val="window" lastClr="FFFFFF"/>
+      </a:lt1>
+      <a:dk2>
+        <a:srgbClr val="1a1a1a"/>
+      </a:dk2>
+      <a:lt2>
+        <a:srgbClr val="e9edee"/>
+      </a:lt2>
+      <a:accent1>
+        <a:srgbClr val="595959"/>
+      </a:accent1>
+      <a:accent2>
+        <a:srgbClr val="6aa4c8"/>
+      </a:accent2>
+      <a:accent3>
+        <a:srgbClr val="eb5600"/>
+      </a:accent3>
+      <a:accent4>
+        <a:srgbClr val="a2ffe8"/>
+      </a:accent4>
+      <a:accent5>
+        <a:srgbClr val="1c3678"/>
+      </a:accent5>
+      <a:accent6>
+        <a:srgbClr val="ffb8a2"/>
+      </a:accent6>
+      <a:hlink>
+        <a:srgbClr val="1c3678"/>
+      </a:hlink>
+      <a:folHlink>
+        <a:srgbClr val="1c3678"/>
+      </a:folHlink>
+    </a:clrScheme>
+    <a:fontScheme name="Office">
+      <a:majorFont>
+        <a:latin typeface="Arial"/>
+        <a:ea typeface="DejaVu Sans"/>
+        <a:cs typeface="DejaVu Sans"/>
+      </a:majorFont>
+      <a:minorFont>
+        <a:latin typeface="Arial"/>
+        <a:ea typeface="DejaVu Sans"/>
+        <a:cs typeface="DejaVu Sans"/>
+      </a:minorFont>
+    </a:fontScheme>
+    <a:fmtScheme name="Office">
+      <a:fillStyleLst>
+        <a:solidFill>
+          <a:schemeClr val="phClr"/>
+        </a:solidFill>
+        <a:gradFill rotWithShape="1">
+          <a:gsLst>
+            <a:gs pos="0">
+              <a:schemeClr val="phClr">
+                <a:tint val="50000"/>
+                <a:satMod val="300000"/>
+              </a:schemeClr>
+            </a:gs>
+            <a:gs pos="35000">
+              <a:schemeClr val="phClr">
+                <a:tint val="37000"/>
+                <a:satMod val="300000"/>
+              </a:schemeClr>
+            </a:gs>
+            <a:gs pos="100000">
+              <a:schemeClr val="phClr">
+                <a:tint val="15000"/>
+                <a:satMod val="350000"/>
+              </a:schemeClr>
+            </a:gs>
+          </a:gsLst>
+          <a:lin ang="16200000" scaled="1"/>
+        </a:gradFill>
+        <a:gradFill rotWithShape="1">
+          <a:gsLst>
+            <a:gs pos="0">
+              <a:schemeClr val="phClr">
+                <a:shade val="51000"/>
+                <a:satMod val="130000"/>
+              </a:schemeClr>
+            </a:gs>
+            <a:gs pos="80000">
+              <a:schemeClr val="phClr">
+                <a:shade val="93000"/>
+                <a:satMod val="130000"/>
+              </a:schemeClr>
+            </a:gs>
+            <a:gs pos="100000">
+              <a:schemeClr val="phClr">
+                <a:shade val="94000"/>
+                <a:satMod val="135000"/>
+              </a:schemeClr>
+            </a:gs>
+          </a:gsLst>
+          <a:lin ang="16200000" scaled="0"/>
+        </a:gradFill>
+      </a:fillStyleLst>
+      <a:lnStyleLst>
+        <a:ln w="9525" cap="flat" cmpd="sng" algn="ctr">
+          <a:solidFill>
+            <a:schemeClr val="phClr">
+              <a:shade val="95000"/>
+              <a:satMod val="105000"/>
+            </a:schemeClr>
+          </a:solidFill>
+          <a:prstDash val="solid"/>
+          <a:miter/>
+        </a:ln>
+        <a:ln w="25400" cap="flat" cmpd="sng" algn="ctr">
+          <a:solidFill>
+            <a:schemeClr val="phClr"/>
+          </a:solidFill>
+          <a:prstDash val="solid"/>
+          <a:miter/>
+        </a:ln>
+        <a:ln w="38100" cap="flat" cmpd="sng" algn="ctr">
+          <a:solidFill>
+            <a:schemeClr val="phClr"/>
+          </a:solidFill>
+          <a:prstDash val="solid"/>
+          <a:miter/>
+        </a:ln>
+      </a:lnStyleLst>
+      <a:effectStyleLst>
+        <a:effectStyle>
+          <a:effectLst>
+            <a:outerShdw blurRad="40000" dist="20000" dir="5400000" rotWithShape="0">
+              <a:srgbClr val="000000">
+                <a:alpha val="38000"/>
+              </a:srgbClr>
+            </a:outerShdw>
+          </a:effectLst>
+        </a:effectStyle>
+        <a:effectStyle>
+          <a:effectLst>
+            <a:outerShdw blurRad="40000" dist="23000" dir="5400000" rotWithShape="0">
+              <a:srgbClr val="000000">
+                <a:alpha val="35000"/>
+              </a:srgbClr>
+            </a:outerShdw>
+          </a:effectLst>
+        </a:effectStyle>
+        <a:effectStyle>
+          <a:effectLst>
+            <a:outerShdw blurRad="40000" dist="23000" dir="5400000" rotWithShape="0">
+              <a:srgbClr val="000000">
+                <a:alpha val="35000"/>
+              </a:srgbClr>
+            </a:outerShdw>
+          </a:effectLst>
+          <a:scene3d>
+            <a:camera prst="orthographicFront">
+              <a:rot lat="0" lon="0" rev="0"/>
+            </a:camera>
+            <a:lightRig rig="threePt" dir="t">
+              <a:rot lat="0" lon="0" rev="1200000"/>
+            </a:lightRig>
+          </a:scene3d>
+          <a:sp3d>
+            <a:bevelT w="63500" h="25400"/>
+          </a:sp3d>
+        </a:effectStyle>
+      </a:effectStyleLst>
+      <a:bgFillStyleLst>
+        <a:solidFill>
+          <a:schemeClr val="phClr"/>
+        </a:solidFill>
+        <a:gradFill rotWithShape="1">
+          <a:gsLst>
+            <a:gs pos="0">
+              <a:schemeClr val="phClr">
+                <a:tint val="40000"/>
+                <a:satMod val="350000"/>
+              </a:schemeClr>
+            </a:gs>
+            <a:gs pos="40000">
+              <a:schemeClr val="phClr">
+                <a:tint val="45000"/>
+                <a:shade val="99000"/>
+                <a:satMod val="350000"/>
+              </a:schemeClr>
+            </a:gs>
+            <a:gs pos="100000">
+              <a:schemeClr val="phClr">
+                <a:shade val="20000"/>
+                <a:satMod val="255000"/>
+              </a:schemeClr>
+            </a:gs>
+          </a:gsLst>
+          <a:path path="circle">
+            <a:fillToRect l="50000" t="-80000" r="50000" b="180000"/>
+          </a:path>
+        </a:gradFill>
+        <a:gradFill rotWithShape="1">
+          <a:gsLst>
+            <a:gs pos="0">
+              <a:schemeClr val="phClr">
+                <a:tint val="80000"/>
+                <a:satMod val="300000"/>
+              </a:schemeClr>
+            </a:gs>
+            <a:gs pos="100000">
+              <a:schemeClr val="phClr">
+                <a:shade val="30000"/>
+                <a:satMod val="200000"/>
+              </a:schemeClr>
+            </a:gs>
+          </a:gsLst>
+          <a:path path="circle">
+            <a:fillToRect l="50000" t="50000" r="50000" b="50000"/>
+          </a:path>
+        </a:gradFill>
+      </a:bgFillStyleLst>
+    </a:fmtScheme>
+  </a:themeElements>
+</a:theme>
 </file>
</xml_diff>